<commit_message>
Updates to the poster format
</commit_message>
<xml_diff>
--- a/devdocs/EnvNoiseDetectorPosterExample.pptx
+++ b/devdocs/EnvNoiseDetectorPosterExample.pptx
@@ -104,6 +104,22 @@
       </a:defRPr>
     </a:lvl9pPr>
   </p:defaultTextStyle>
+  <p:extLst>
+    <p:ext uri="{EFAFB233-063F-42B5-8137-9DF3F51BA10A}">
+      <p15:sldGuideLst xmlns:p15="http://schemas.microsoft.com/office/powerpoint/2012/main">
+        <p15:guide id="1" orient="horz" pos="10368" userDrawn="1">
+          <p15:clr>
+            <a:srgbClr val="A4A3A4"/>
+          </p15:clr>
+        </p15:guide>
+        <p15:guide id="2" pos="13824" userDrawn="1">
+          <p15:clr>
+            <a:srgbClr val="A4A3A4"/>
+          </p15:clr>
+        </p15:guide>
+      </p15:sldGuideLst>
+    </p:ext>
+  </p:extLst>
 </p:presentation>
 </file>
 
@@ -238,7 +254,7 @@
           <a:p>
             <a:fld id="{E153FC24-88DC-4CE4-A3C2-9F31CD4F9CE4}" type="datetimeFigureOut">
               <a:rPr lang="en-US" smtClean="0"/>
-              <a:t>2/23/2019</a:t>
+              <a:t>2/24/2019</a:t>
             </a:fld>
             <a:endParaRPr lang="en-US"/>
           </a:p>
@@ -408,7 +424,7 @@
           <a:p>
             <a:fld id="{E153FC24-88DC-4CE4-A3C2-9F31CD4F9CE4}" type="datetimeFigureOut">
               <a:rPr lang="en-US" smtClean="0"/>
-              <a:t>2/23/2019</a:t>
+              <a:t>2/24/2019</a:t>
             </a:fld>
             <a:endParaRPr lang="en-US"/>
           </a:p>
@@ -588,7 +604,7 @@
           <a:p>
             <a:fld id="{E153FC24-88DC-4CE4-A3C2-9F31CD4F9CE4}" type="datetimeFigureOut">
               <a:rPr lang="en-US" smtClean="0"/>
-              <a:t>2/23/2019</a:t>
+              <a:t>2/24/2019</a:t>
             </a:fld>
             <a:endParaRPr lang="en-US"/>
           </a:p>
@@ -758,7 +774,7 @@
           <a:p>
             <a:fld id="{E153FC24-88DC-4CE4-A3C2-9F31CD4F9CE4}" type="datetimeFigureOut">
               <a:rPr lang="en-US" smtClean="0"/>
-              <a:t>2/23/2019</a:t>
+              <a:t>2/24/2019</a:t>
             </a:fld>
             <a:endParaRPr lang="en-US"/>
           </a:p>
@@ -1002,7 +1018,7 @@
           <a:p>
             <a:fld id="{E153FC24-88DC-4CE4-A3C2-9F31CD4F9CE4}" type="datetimeFigureOut">
               <a:rPr lang="en-US" smtClean="0"/>
-              <a:t>2/23/2019</a:t>
+              <a:t>2/24/2019</a:t>
             </a:fld>
             <a:endParaRPr lang="en-US"/>
           </a:p>
@@ -1234,7 +1250,7 @@
           <a:p>
             <a:fld id="{E153FC24-88DC-4CE4-A3C2-9F31CD4F9CE4}" type="datetimeFigureOut">
               <a:rPr lang="en-US" smtClean="0"/>
-              <a:t>2/23/2019</a:t>
+              <a:t>2/24/2019</a:t>
             </a:fld>
             <a:endParaRPr lang="en-US"/>
           </a:p>
@@ -1601,7 +1617,7 @@
           <a:p>
             <a:fld id="{E153FC24-88DC-4CE4-A3C2-9F31CD4F9CE4}" type="datetimeFigureOut">
               <a:rPr lang="en-US" smtClean="0"/>
-              <a:t>2/23/2019</a:t>
+              <a:t>2/24/2019</a:t>
             </a:fld>
             <a:endParaRPr lang="en-US"/>
           </a:p>
@@ -1719,7 +1735,7 @@
           <a:p>
             <a:fld id="{E153FC24-88DC-4CE4-A3C2-9F31CD4F9CE4}" type="datetimeFigureOut">
               <a:rPr lang="en-US" smtClean="0"/>
-              <a:t>2/23/2019</a:t>
+              <a:t>2/24/2019</a:t>
             </a:fld>
             <a:endParaRPr lang="en-US"/>
           </a:p>
@@ -1814,7 +1830,7 @@
           <a:p>
             <a:fld id="{E153FC24-88DC-4CE4-A3C2-9F31CD4F9CE4}" type="datetimeFigureOut">
               <a:rPr lang="en-US" smtClean="0"/>
-              <a:t>2/23/2019</a:t>
+              <a:t>2/24/2019</a:t>
             </a:fld>
             <a:endParaRPr lang="en-US"/>
           </a:p>
@@ -2091,7 +2107,7 @@
           <a:p>
             <a:fld id="{E153FC24-88DC-4CE4-A3C2-9F31CD4F9CE4}" type="datetimeFigureOut">
               <a:rPr lang="en-US" smtClean="0"/>
-              <a:t>2/23/2019</a:t>
+              <a:t>2/24/2019</a:t>
             </a:fld>
             <a:endParaRPr lang="en-US"/>
           </a:p>
@@ -2348,7 +2364,7 @@
           <a:p>
             <a:fld id="{E153FC24-88DC-4CE4-A3C2-9F31CD4F9CE4}" type="datetimeFigureOut">
               <a:rPr lang="en-US" smtClean="0"/>
-              <a:t>2/23/2019</a:t>
+              <a:t>2/24/2019</a:t>
             </a:fld>
             <a:endParaRPr lang="en-US"/>
           </a:p>
@@ -2561,7 +2577,7 @@
           <a:p>
             <a:fld id="{E153FC24-88DC-4CE4-A3C2-9F31CD4F9CE4}" type="datetimeFigureOut">
               <a:rPr lang="en-US" smtClean="0"/>
-              <a:t>2/23/2019</a:t>
+              <a:t>2/24/2019</a:t>
             </a:fld>
             <a:endParaRPr lang="en-US"/>
           </a:p>
@@ -2955,7 +2971,7 @@
     <p:bg>
       <p:bgPr>
         <a:solidFill>
-          <a:srgbClr val="EBF4FF"/>
+          <a:srgbClr val="191E28"/>
         </a:solidFill>
         <a:effectLst/>
       </p:bgPr>
@@ -2976,6 +2992,149 @@
       </p:grpSpPr>
       <p:sp>
         <p:nvSpPr>
+          <p:cNvPr id="8" name="Rectangle 7" descr="Purple Header Bar">
+            <a:extLst>
+              <a:ext uri="{FF2B5EF4-FFF2-40B4-BE49-F238E27FC236}">
+                <a16:creationId xmlns:a16="http://schemas.microsoft.com/office/drawing/2014/main" id="{FB308520-BCA4-4923-9B44-A9CFC90D8BFF}"/>
+              </a:ext>
+            </a:extLst>
+          </p:cNvPr>
+          <p:cNvSpPr/>
+          <p:nvPr/>
+        </p:nvSpPr>
+        <p:spPr>
+          <a:xfrm>
+            <a:off x="0" y="-31492"/>
+            <a:ext cx="43891200" cy="2955578"/>
+          </a:xfrm>
+          <a:prstGeom prst="rect">
+            <a:avLst/>
+          </a:prstGeom>
+          <a:solidFill>
+            <a:srgbClr val="33016F"/>
+          </a:solidFill>
+        </p:spPr>
+        <p:style>
+          <a:lnRef idx="2">
+            <a:schemeClr val="accent1">
+              <a:shade val="50000"/>
+            </a:schemeClr>
+          </a:lnRef>
+          <a:fillRef idx="1">
+            <a:schemeClr val="accent1"/>
+          </a:fillRef>
+          <a:effectRef idx="0">
+            <a:schemeClr val="accent1"/>
+          </a:effectRef>
+          <a:fontRef idx="minor">
+            <a:schemeClr val="lt1"/>
+          </a:fontRef>
+        </p:style>
+        <p:txBody>
+          <a:bodyPr rtlCol="0" anchor="ctr"/>
+          <a:lstStyle>
+            <a:defPPr>
+              <a:defRPr lang="en-US"/>
+            </a:defPPr>
+            <a:lvl1pPr marL="0" algn="l" defTabSz="2633472" rtl="0" eaLnBrk="1" latinLnBrk="0" hangingPunct="1">
+              <a:defRPr sz="5184" kern="1200">
+                <a:solidFill>
+                  <a:schemeClr val="lt1"/>
+                </a:solidFill>
+                <a:latin typeface="+mn-lt"/>
+                <a:ea typeface="+mn-ea"/>
+                <a:cs typeface="+mn-cs"/>
+              </a:defRPr>
+            </a:lvl1pPr>
+            <a:lvl2pPr marL="1316736" algn="l" defTabSz="2633472" rtl="0" eaLnBrk="1" latinLnBrk="0" hangingPunct="1">
+              <a:defRPr sz="5184" kern="1200">
+                <a:solidFill>
+                  <a:schemeClr val="lt1"/>
+                </a:solidFill>
+                <a:latin typeface="+mn-lt"/>
+                <a:ea typeface="+mn-ea"/>
+                <a:cs typeface="+mn-cs"/>
+              </a:defRPr>
+            </a:lvl2pPr>
+            <a:lvl3pPr marL="2633472" algn="l" defTabSz="2633472" rtl="0" eaLnBrk="1" latinLnBrk="0" hangingPunct="1">
+              <a:defRPr sz="5184" kern="1200">
+                <a:solidFill>
+                  <a:schemeClr val="lt1"/>
+                </a:solidFill>
+                <a:latin typeface="+mn-lt"/>
+                <a:ea typeface="+mn-ea"/>
+                <a:cs typeface="+mn-cs"/>
+              </a:defRPr>
+            </a:lvl3pPr>
+            <a:lvl4pPr marL="3950208" algn="l" defTabSz="2633472" rtl="0" eaLnBrk="1" latinLnBrk="0" hangingPunct="1">
+              <a:defRPr sz="5184" kern="1200">
+                <a:solidFill>
+                  <a:schemeClr val="lt1"/>
+                </a:solidFill>
+                <a:latin typeface="+mn-lt"/>
+                <a:ea typeface="+mn-ea"/>
+                <a:cs typeface="+mn-cs"/>
+              </a:defRPr>
+            </a:lvl4pPr>
+            <a:lvl5pPr marL="5266944" algn="l" defTabSz="2633472" rtl="0" eaLnBrk="1" latinLnBrk="0" hangingPunct="1">
+              <a:defRPr sz="5184" kern="1200">
+                <a:solidFill>
+                  <a:schemeClr val="lt1"/>
+                </a:solidFill>
+                <a:latin typeface="+mn-lt"/>
+                <a:ea typeface="+mn-ea"/>
+                <a:cs typeface="+mn-cs"/>
+              </a:defRPr>
+            </a:lvl5pPr>
+            <a:lvl6pPr marL="6583680" algn="l" defTabSz="2633472" rtl="0" eaLnBrk="1" latinLnBrk="0" hangingPunct="1">
+              <a:defRPr sz="5184" kern="1200">
+                <a:solidFill>
+                  <a:schemeClr val="lt1"/>
+                </a:solidFill>
+                <a:latin typeface="+mn-lt"/>
+                <a:ea typeface="+mn-ea"/>
+                <a:cs typeface="+mn-cs"/>
+              </a:defRPr>
+            </a:lvl6pPr>
+            <a:lvl7pPr marL="7900416" algn="l" defTabSz="2633472" rtl="0" eaLnBrk="1" latinLnBrk="0" hangingPunct="1">
+              <a:defRPr sz="5184" kern="1200">
+                <a:solidFill>
+                  <a:schemeClr val="lt1"/>
+                </a:solidFill>
+                <a:latin typeface="+mn-lt"/>
+                <a:ea typeface="+mn-ea"/>
+                <a:cs typeface="+mn-cs"/>
+              </a:defRPr>
+            </a:lvl7pPr>
+            <a:lvl8pPr marL="9217152" algn="l" defTabSz="2633472" rtl="0" eaLnBrk="1" latinLnBrk="0" hangingPunct="1">
+              <a:defRPr sz="5184" kern="1200">
+                <a:solidFill>
+                  <a:schemeClr val="lt1"/>
+                </a:solidFill>
+                <a:latin typeface="+mn-lt"/>
+                <a:ea typeface="+mn-ea"/>
+                <a:cs typeface="+mn-cs"/>
+              </a:defRPr>
+            </a:lvl8pPr>
+            <a:lvl9pPr marL="10533888" algn="l" defTabSz="2633472" rtl="0" eaLnBrk="1" latinLnBrk="0" hangingPunct="1">
+              <a:defRPr sz="5184" kern="1200">
+                <a:solidFill>
+                  <a:schemeClr val="lt1"/>
+                </a:solidFill>
+                <a:latin typeface="+mn-lt"/>
+                <a:ea typeface="+mn-ea"/>
+                <a:cs typeface="+mn-cs"/>
+              </a:defRPr>
+            </a:lvl9pPr>
+          </a:lstStyle>
+          <a:p>
+            <a:pPr algn="ctr"/>
+            <a:endParaRPr lang="en-US"/>
+          </a:p>
+        </p:txBody>
+      </p:sp>
+      <p:sp>
+        <p:nvSpPr>
           <p:cNvPr id="4" name="TextBox 3">
             <a:extLst>
               <a:ext uri="{FF2B5EF4-FFF2-40B4-BE49-F238E27FC236}">
@@ -2988,7 +3147,7 @@
         </p:nvSpPr>
         <p:spPr>
           <a:xfrm>
-            <a:off x="9801225" y="554206"/>
+            <a:off x="608870" y="261357"/>
             <a:ext cx="24288750" cy="1446550"/>
           </a:xfrm>
           <a:prstGeom prst="rect">
@@ -3004,7 +3163,12 @@
           <a:p>
             <a:r>
               <a:rPr lang="en-US" sz="8800" dirty="0">
-                <a:latin typeface="Segoe UI Semibold" panose="020B0702040204020203" pitchFamily="34" charset="0"/>
+                <a:solidFill>
+                  <a:schemeClr val="bg1">
+                    <a:lumMod val="95000"/>
+                  </a:schemeClr>
+                </a:solidFill>
+                <a:latin typeface="Encode Sans Condensed Black" panose="00000A06000000000000" pitchFamily="2" charset="0"/>
                 <a:cs typeface="Segoe UI Semibold" panose="020B0702040204020203" pitchFamily="34" charset="0"/>
               </a:rPr>
               <a:t>Environmental Noise Contamination Detection</a:t>
@@ -3026,8 +3190,8 @@
         </p:nvSpPr>
         <p:spPr>
           <a:xfrm>
-            <a:off x="15444788" y="2000756"/>
-            <a:ext cx="11844338" cy="923330"/>
+            <a:off x="619931" y="1854331"/>
+            <a:ext cx="12406312" cy="923330"/>
           </a:xfrm>
           <a:prstGeom prst="rect">
             <a:avLst/>
@@ -3041,7 +3205,14 @@
           <a:lstStyle/>
           <a:p>
             <a:r>
-              <a:rPr lang="en-US" sz="5400" dirty="0"/>
+              <a:rPr lang="en-US" sz="5400" dirty="0">
+                <a:solidFill>
+                  <a:schemeClr val="bg1">
+                    <a:lumMod val="95000"/>
+                  </a:schemeClr>
+                </a:solidFill>
+                <a:latin typeface="Encode Sans Condensed ExtraBold" panose="00000906000000000000" pitchFamily="2" charset="0"/>
+              </a:rPr>
               <a:t>Todd Schultz, Rahul Birmiwal, Sean Miller</a:t>
             </a:r>
           </a:p>
@@ -3061,15 +3232,29 @@
         </p:nvSpPr>
         <p:spPr>
           <a:xfrm>
-            <a:off x="1743075" y="4257675"/>
-            <a:ext cx="8915400" cy="584775"/>
+            <a:off x="914400" y="3657600"/>
+            <a:ext cx="8277225" cy="584775"/>
           </a:xfrm>
           <a:prstGeom prst="rect">
             <a:avLst/>
           </a:prstGeom>
-          <a:solidFill>
-            <a:srgbClr val="F4B184"/>
-          </a:solidFill>
+          <a:gradFill>
+            <a:gsLst>
+              <a:gs pos="87000">
+                <a:srgbClr val="0070C0"/>
+              </a:gs>
+              <a:gs pos="22000">
+                <a:srgbClr val="00B0F0"/>
+              </a:gs>
+              <a:gs pos="100000">
+                <a:schemeClr val="accent1">
+                  <a:lumMod val="30000"/>
+                  <a:lumOff val="70000"/>
+                </a:schemeClr>
+              </a:gs>
+            </a:gsLst>
+            <a:lin ang="5400000" scaled="1"/>
+          </a:gradFill>
         </p:spPr>
         <p:txBody>
           <a:bodyPr wrap="square" rtlCol="0">
@@ -3079,7 +3264,17 @@
           <a:p>
             <a:pPr algn="ctr"/>
             <a:r>
-              <a:rPr lang="en-US" sz="3200" dirty="0"/>
+              <a:rPr lang="en-US" sz="3200" b="1" dirty="0">
+                <a:solidFill>
+                  <a:schemeClr val="tx1">
+                    <a:lumMod val="85000"/>
+                    <a:lumOff val="15000"/>
+                  </a:schemeClr>
+                </a:solidFill>
+                <a:latin typeface="Open Sans" panose="020B0606030504020204" pitchFamily="34" charset="0"/>
+                <a:ea typeface="Open Sans" panose="020B0606030504020204" pitchFamily="34" charset="0"/>
+                <a:cs typeface="Open Sans" panose="020B0606030504020204" pitchFamily="34" charset="0"/>
+              </a:rPr>
               <a:t>Project Overview</a:t>
             </a:r>
           </a:p>
@@ -3099,8 +3294,8 @@
         </p:nvSpPr>
         <p:spPr>
           <a:xfrm>
-            <a:off x="1743075" y="5017115"/>
-            <a:ext cx="8915400" cy="4832092"/>
+            <a:off x="910713" y="4457700"/>
+            <a:ext cx="8277225" cy="5693866"/>
           </a:xfrm>
           <a:prstGeom prst="rect">
             <a:avLst/>
@@ -3114,468 +3309,1539 @@
           <a:lstStyle/>
           <a:p>
             <a:r>
-              <a:rPr lang="en-US" sz="2800" dirty="0"/>
+              <a:rPr lang="en-US" sz="2800" dirty="0">
+                <a:solidFill>
+                  <a:schemeClr val="bg1">
+                    <a:lumMod val="95000"/>
+                  </a:schemeClr>
+                </a:solidFill>
+                <a:latin typeface="Open Sans" panose="020B0606030504020204" pitchFamily="34" charset="0"/>
+                <a:ea typeface="Open Sans" panose="020B0606030504020204" pitchFamily="34" charset="0"/>
+                <a:cs typeface="Open Sans" panose="020B0606030504020204" pitchFamily="34" charset="0"/>
+              </a:rPr>
               <a:t>Lorem ipsum dolor sit </a:t>
             </a:r>
             <a:r>
-              <a:rPr lang="en-US" sz="2800" dirty="0" err="1"/>
+              <a:rPr lang="en-US" sz="2800" dirty="0" err="1">
+                <a:solidFill>
+                  <a:schemeClr val="bg1">
+                    <a:lumMod val="95000"/>
+                  </a:schemeClr>
+                </a:solidFill>
+                <a:latin typeface="Open Sans" panose="020B0606030504020204" pitchFamily="34" charset="0"/>
+                <a:ea typeface="Open Sans" panose="020B0606030504020204" pitchFamily="34" charset="0"/>
+                <a:cs typeface="Open Sans" panose="020B0606030504020204" pitchFamily="34" charset="0"/>
+              </a:rPr>
               <a:t>amet</a:t>
             </a:r>
             <a:r>
-              <a:rPr lang="en-US" sz="2800" dirty="0"/>
+              <a:rPr lang="en-US" sz="2800" dirty="0">
+                <a:solidFill>
+                  <a:schemeClr val="bg1">
+                    <a:lumMod val="95000"/>
+                  </a:schemeClr>
+                </a:solidFill>
+                <a:latin typeface="Open Sans" panose="020B0606030504020204" pitchFamily="34" charset="0"/>
+                <a:ea typeface="Open Sans" panose="020B0606030504020204" pitchFamily="34" charset="0"/>
+                <a:cs typeface="Open Sans" panose="020B0606030504020204" pitchFamily="34" charset="0"/>
+              </a:rPr>
               <a:t>, </a:t>
             </a:r>
             <a:r>
-              <a:rPr lang="en-US" sz="2800" dirty="0" err="1"/>
+              <a:rPr lang="en-US" sz="2800" dirty="0" err="1">
+                <a:solidFill>
+                  <a:schemeClr val="bg1">
+                    <a:lumMod val="95000"/>
+                  </a:schemeClr>
+                </a:solidFill>
+                <a:latin typeface="Open Sans" panose="020B0606030504020204" pitchFamily="34" charset="0"/>
+                <a:ea typeface="Open Sans" panose="020B0606030504020204" pitchFamily="34" charset="0"/>
+                <a:cs typeface="Open Sans" panose="020B0606030504020204" pitchFamily="34" charset="0"/>
+              </a:rPr>
               <a:t>consectetur</a:t>
             </a:r>
             <a:r>
-              <a:rPr lang="en-US" sz="2800" dirty="0"/>
+              <a:rPr lang="en-US" sz="2800" dirty="0">
+                <a:solidFill>
+                  <a:schemeClr val="bg1">
+                    <a:lumMod val="95000"/>
+                  </a:schemeClr>
+                </a:solidFill>
+                <a:latin typeface="Open Sans" panose="020B0606030504020204" pitchFamily="34" charset="0"/>
+                <a:ea typeface="Open Sans" panose="020B0606030504020204" pitchFamily="34" charset="0"/>
+                <a:cs typeface="Open Sans" panose="020B0606030504020204" pitchFamily="34" charset="0"/>
+              </a:rPr>
               <a:t> </a:t>
             </a:r>
             <a:r>
-              <a:rPr lang="en-US" sz="2800" dirty="0" err="1"/>
+              <a:rPr lang="en-US" sz="2800" dirty="0" err="1">
+                <a:solidFill>
+                  <a:schemeClr val="bg1">
+                    <a:lumMod val="95000"/>
+                  </a:schemeClr>
+                </a:solidFill>
+                <a:latin typeface="Open Sans" panose="020B0606030504020204" pitchFamily="34" charset="0"/>
+                <a:ea typeface="Open Sans" panose="020B0606030504020204" pitchFamily="34" charset="0"/>
+                <a:cs typeface="Open Sans" panose="020B0606030504020204" pitchFamily="34" charset="0"/>
+              </a:rPr>
               <a:t>adipiscing</a:t>
             </a:r>
             <a:r>
-              <a:rPr lang="en-US" sz="2800" dirty="0"/>
+              <a:rPr lang="en-US" sz="2800" dirty="0">
+                <a:solidFill>
+                  <a:schemeClr val="bg1">
+                    <a:lumMod val="95000"/>
+                  </a:schemeClr>
+                </a:solidFill>
+                <a:latin typeface="Open Sans" panose="020B0606030504020204" pitchFamily="34" charset="0"/>
+                <a:ea typeface="Open Sans" panose="020B0606030504020204" pitchFamily="34" charset="0"/>
+                <a:cs typeface="Open Sans" panose="020B0606030504020204" pitchFamily="34" charset="0"/>
+              </a:rPr>
               <a:t> </a:t>
             </a:r>
             <a:r>
-              <a:rPr lang="en-US" sz="2800" dirty="0" err="1"/>
+              <a:rPr lang="en-US" sz="2800" dirty="0" err="1">
+                <a:solidFill>
+                  <a:schemeClr val="bg1">
+                    <a:lumMod val="95000"/>
+                  </a:schemeClr>
+                </a:solidFill>
+                <a:latin typeface="Open Sans" panose="020B0606030504020204" pitchFamily="34" charset="0"/>
+                <a:ea typeface="Open Sans" panose="020B0606030504020204" pitchFamily="34" charset="0"/>
+                <a:cs typeface="Open Sans" panose="020B0606030504020204" pitchFamily="34" charset="0"/>
+              </a:rPr>
               <a:t>elit</a:t>
             </a:r>
             <a:r>
-              <a:rPr lang="en-US" sz="2800" dirty="0"/>
+              <a:rPr lang="en-US" sz="2800" dirty="0">
+                <a:solidFill>
+                  <a:schemeClr val="bg1">
+                    <a:lumMod val="95000"/>
+                  </a:schemeClr>
+                </a:solidFill>
+                <a:latin typeface="Open Sans" panose="020B0606030504020204" pitchFamily="34" charset="0"/>
+                <a:ea typeface="Open Sans" panose="020B0606030504020204" pitchFamily="34" charset="0"/>
+                <a:cs typeface="Open Sans" panose="020B0606030504020204" pitchFamily="34" charset="0"/>
+              </a:rPr>
               <a:t>. </a:t>
             </a:r>
             <a:r>
-              <a:rPr lang="en-US" sz="2800" dirty="0" err="1"/>
+              <a:rPr lang="en-US" sz="2800" dirty="0" err="1">
+                <a:solidFill>
+                  <a:schemeClr val="bg1">
+                    <a:lumMod val="95000"/>
+                  </a:schemeClr>
+                </a:solidFill>
+                <a:latin typeface="Open Sans" panose="020B0606030504020204" pitchFamily="34" charset="0"/>
+                <a:ea typeface="Open Sans" panose="020B0606030504020204" pitchFamily="34" charset="0"/>
+                <a:cs typeface="Open Sans" panose="020B0606030504020204" pitchFamily="34" charset="0"/>
+              </a:rPr>
               <a:t>Curabitur</a:t>
             </a:r>
             <a:r>
-              <a:rPr lang="en-US" sz="2800" dirty="0"/>
+              <a:rPr lang="en-US" sz="2800" dirty="0">
+                <a:solidFill>
+                  <a:schemeClr val="bg1">
+                    <a:lumMod val="95000"/>
+                  </a:schemeClr>
+                </a:solidFill>
+                <a:latin typeface="Open Sans" panose="020B0606030504020204" pitchFamily="34" charset="0"/>
+                <a:ea typeface="Open Sans" panose="020B0606030504020204" pitchFamily="34" charset="0"/>
+                <a:cs typeface="Open Sans" panose="020B0606030504020204" pitchFamily="34" charset="0"/>
+              </a:rPr>
               <a:t> </a:t>
             </a:r>
             <a:r>
-              <a:rPr lang="en-US" sz="2800" dirty="0" err="1"/>
+              <a:rPr lang="en-US" sz="2800" dirty="0" err="1">
+                <a:solidFill>
+                  <a:schemeClr val="bg1">
+                    <a:lumMod val="95000"/>
+                  </a:schemeClr>
+                </a:solidFill>
+                <a:latin typeface="Open Sans" panose="020B0606030504020204" pitchFamily="34" charset="0"/>
+                <a:ea typeface="Open Sans" panose="020B0606030504020204" pitchFamily="34" charset="0"/>
+                <a:cs typeface="Open Sans" panose="020B0606030504020204" pitchFamily="34" charset="0"/>
+              </a:rPr>
               <a:t>sagittis</a:t>
             </a:r>
             <a:r>
-              <a:rPr lang="en-US" sz="2800" dirty="0"/>
+              <a:rPr lang="en-US" sz="2800" dirty="0">
+                <a:solidFill>
+                  <a:schemeClr val="bg1">
+                    <a:lumMod val="95000"/>
+                  </a:schemeClr>
+                </a:solidFill>
+                <a:latin typeface="Open Sans" panose="020B0606030504020204" pitchFamily="34" charset="0"/>
+                <a:ea typeface="Open Sans" panose="020B0606030504020204" pitchFamily="34" charset="0"/>
+                <a:cs typeface="Open Sans" panose="020B0606030504020204" pitchFamily="34" charset="0"/>
+              </a:rPr>
               <a:t>, </a:t>
             </a:r>
             <a:r>
-              <a:rPr lang="en-US" sz="2800" dirty="0" err="1"/>
+              <a:rPr lang="en-US" sz="2800" dirty="0" err="1">
+                <a:solidFill>
+                  <a:schemeClr val="bg1">
+                    <a:lumMod val="95000"/>
+                  </a:schemeClr>
+                </a:solidFill>
+                <a:latin typeface="Open Sans" panose="020B0606030504020204" pitchFamily="34" charset="0"/>
+                <a:ea typeface="Open Sans" panose="020B0606030504020204" pitchFamily="34" charset="0"/>
+                <a:cs typeface="Open Sans" panose="020B0606030504020204" pitchFamily="34" charset="0"/>
+              </a:rPr>
               <a:t>sapien</a:t>
             </a:r>
             <a:r>
-              <a:rPr lang="en-US" sz="2800" dirty="0"/>
+              <a:rPr lang="en-US" sz="2800" dirty="0">
+                <a:solidFill>
+                  <a:schemeClr val="bg1">
+                    <a:lumMod val="95000"/>
+                  </a:schemeClr>
+                </a:solidFill>
+                <a:latin typeface="Open Sans" panose="020B0606030504020204" pitchFamily="34" charset="0"/>
+                <a:ea typeface="Open Sans" panose="020B0606030504020204" pitchFamily="34" charset="0"/>
+                <a:cs typeface="Open Sans" panose="020B0606030504020204" pitchFamily="34" charset="0"/>
+              </a:rPr>
               <a:t> </a:t>
             </a:r>
             <a:r>
-              <a:rPr lang="en-US" sz="2800" dirty="0" err="1"/>
+              <a:rPr lang="en-US" sz="2800" dirty="0" err="1">
+                <a:solidFill>
+                  <a:schemeClr val="bg1">
+                    <a:lumMod val="95000"/>
+                  </a:schemeClr>
+                </a:solidFill>
+                <a:latin typeface="Open Sans" panose="020B0606030504020204" pitchFamily="34" charset="0"/>
+                <a:ea typeface="Open Sans" panose="020B0606030504020204" pitchFamily="34" charset="0"/>
+                <a:cs typeface="Open Sans" panose="020B0606030504020204" pitchFamily="34" charset="0"/>
+              </a:rPr>
               <a:t>nec</a:t>
             </a:r>
             <a:r>
-              <a:rPr lang="en-US" sz="2800" dirty="0"/>
+              <a:rPr lang="en-US" sz="2800" dirty="0">
+                <a:solidFill>
+                  <a:schemeClr val="bg1">
+                    <a:lumMod val="95000"/>
+                  </a:schemeClr>
+                </a:solidFill>
+                <a:latin typeface="Open Sans" panose="020B0606030504020204" pitchFamily="34" charset="0"/>
+                <a:ea typeface="Open Sans" panose="020B0606030504020204" pitchFamily="34" charset="0"/>
+                <a:cs typeface="Open Sans" panose="020B0606030504020204" pitchFamily="34" charset="0"/>
+              </a:rPr>
               <a:t> </a:t>
             </a:r>
             <a:r>
-              <a:rPr lang="en-US" sz="2800" dirty="0" err="1"/>
+              <a:rPr lang="en-US" sz="2800" dirty="0" err="1">
+                <a:solidFill>
+                  <a:schemeClr val="bg1">
+                    <a:lumMod val="95000"/>
+                  </a:schemeClr>
+                </a:solidFill>
+                <a:latin typeface="Open Sans" panose="020B0606030504020204" pitchFamily="34" charset="0"/>
+                <a:ea typeface="Open Sans" panose="020B0606030504020204" pitchFamily="34" charset="0"/>
+                <a:cs typeface="Open Sans" panose="020B0606030504020204" pitchFamily="34" charset="0"/>
+              </a:rPr>
               <a:t>bibendum</a:t>
             </a:r>
             <a:r>
-              <a:rPr lang="en-US" sz="2800" dirty="0"/>
+              <a:rPr lang="en-US" sz="2800" dirty="0">
+                <a:solidFill>
+                  <a:schemeClr val="bg1">
+                    <a:lumMod val="95000"/>
+                  </a:schemeClr>
+                </a:solidFill>
+                <a:latin typeface="Open Sans" panose="020B0606030504020204" pitchFamily="34" charset="0"/>
+                <a:ea typeface="Open Sans" panose="020B0606030504020204" pitchFamily="34" charset="0"/>
+                <a:cs typeface="Open Sans" panose="020B0606030504020204" pitchFamily="34" charset="0"/>
+              </a:rPr>
               <a:t> </a:t>
             </a:r>
             <a:r>
-              <a:rPr lang="en-US" sz="2800" dirty="0" err="1"/>
+              <a:rPr lang="en-US" sz="2800" dirty="0" err="1">
+                <a:solidFill>
+                  <a:schemeClr val="bg1">
+                    <a:lumMod val="95000"/>
+                  </a:schemeClr>
+                </a:solidFill>
+                <a:latin typeface="Open Sans" panose="020B0606030504020204" pitchFamily="34" charset="0"/>
+                <a:ea typeface="Open Sans" panose="020B0606030504020204" pitchFamily="34" charset="0"/>
+                <a:cs typeface="Open Sans" panose="020B0606030504020204" pitchFamily="34" charset="0"/>
+              </a:rPr>
               <a:t>sagittis</a:t>
             </a:r>
             <a:r>
-              <a:rPr lang="en-US" sz="2800" dirty="0"/>
+              <a:rPr lang="en-US" sz="2800" dirty="0">
+                <a:solidFill>
+                  <a:schemeClr val="bg1">
+                    <a:lumMod val="95000"/>
+                  </a:schemeClr>
+                </a:solidFill>
+                <a:latin typeface="Open Sans" panose="020B0606030504020204" pitchFamily="34" charset="0"/>
+                <a:ea typeface="Open Sans" panose="020B0606030504020204" pitchFamily="34" charset="0"/>
+                <a:cs typeface="Open Sans" panose="020B0606030504020204" pitchFamily="34" charset="0"/>
+              </a:rPr>
               <a:t>, </a:t>
             </a:r>
             <a:r>
-              <a:rPr lang="en-US" sz="2800" dirty="0" err="1"/>
+              <a:rPr lang="en-US" sz="2800" dirty="0" err="1">
+                <a:solidFill>
+                  <a:schemeClr val="bg1">
+                    <a:lumMod val="95000"/>
+                  </a:schemeClr>
+                </a:solidFill>
+                <a:latin typeface="Open Sans" panose="020B0606030504020204" pitchFamily="34" charset="0"/>
+                <a:ea typeface="Open Sans" panose="020B0606030504020204" pitchFamily="34" charset="0"/>
+                <a:cs typeface="Open Sans" panose="020B0606030504020204" pitchFamily="34" charset="0"/>
+              </a:rPr>
               <a:t>quam</a:t>
             </a:r>
             <a:r>
-              <a:rPr lang="en-US" sz="2800" dirty="0"/>
+              <a:rPr lang="en-US" sz="2800" dirty="0">
+                <a:solidFill>
+                  <a:schemeClr val="bg1">
+                    <a:lumMod val="95000"/>
+                  </a:schemeClr>
+                </a:solidFill>
+                <a:latin typeface="Open Sans" panose="020B0606030504020204" pitchFamily="34" charset="0"/>
+                <a:ea typeface="Open Sans" panose="020B0606030504020204" pitchFamily="34" charset="0"/>
+                <a:cs typeface="Open Sans" panose="020B0606030504020204" pitchFamily="34" charset="0"/>
+              </a:rPr>
               <a:t> nisi </a:t>
             </a:r>
             <a:r>
-              <a:rPr lang="en-US" sz="2800" dirty="0" err="1"/>
+              <a:rPr lang="en-US" sz="2800" dirty="0" err="1">
+                <a:solidFill>
+                  <a:schemeClr val="bg1">
+                    <a:lumMod val="95000"/>
+                  </a:schemeClr>
+                </a:solidFill>
+                <a:latin typeface="Open Sans" panose="020B0606030504020204" pitchFamily="34" charset="0"/>
+                <a:ea typeface="Open Sans" panose="020B0606030504020204" pitchFamily="34" charset="0"/>
+                <a:cs typeface="Open Sans" panose="020B0606030504020204" pitchFamily="34" charset="0"/>
+              </a:rPr>
               <a:t>fringilla</a:t>
             </a:r>
             <a:r>
-              <a:rPr lang="en-US" sz="2800" dirty="0"/>
+              <a:rPr lang="en-US" sz="2800" dirty="0">
+                <a:solidFill>
+                  <a:schemeClr val="bg1">
+                    <a:lumMod val="95000"/>
+                  </a:schemeClr>
+                </a:solidFill>
+                <a:latin typeface="Open Sans" panose="020B0606030504020204" pitchFamily="34" charset="0"/>
+                <a:ea typeface="Open Sans" panose="020B0606030504020204" pitchFamily="34" charset="0"/>
+                <a:cs typeface="Open Sans" panose="020B0606030504020204" pitchFamily="34" charset="0"/>
+              </a:rPr>
               <a:t> </a:t>
             </a:r>
             <a:r>
-              <a:rPr lang="en-US" sz="2800" dirty="0" err="1"/>
+              <a:rPr lang="en-US" sz="2800" dirty="0" err="1">
+                <a:solidFill>
+                  <a:schemeClr val="bg1">
+                    <a:lumMod val="95000"/>
+                  </a:schemeClr>
+                </a:solidFill>
+                <a:latin typeface="Open Sans" panose="020B0606030504020204" pitchFamily="34" charset="0"/>
+                <a:ea typeface="Open Sans" panose="020B0606030504020204" pitchFamily="34" charset="0"/>
+                <a:cs typeface="Open Sans" panose="020B0606030504020204" pitchFamily="34" charset="0"/>
+              </a:rPr>
               <a:t>velit</a:t>
             </a:r>
             <a:r>
-              <a:rPr lang="en-US" sz="2800" dirty="0"/>
+              <a:rPr lang="en-US" sz="2800" dirty="0">
+                <a:solidFill>
+                  <a:schemeClr val="bg1">
+                    <a:lumMod val="95000"/>
+                  </a:schemeClr>
+                </a:solidFill>
+                <a:latin typeface="Open Sans" panose="020B0606030504020204" pitchFamily="34" charset="0"/>
+                <a:ea typeface="Open Sans" panose="020B0606030504020204" pitchFamily="34" charset="0"/>
+                <a:cs typeface="Open Sans" panose="020B0606030504020204" pitchFamily="34" charset="0"/>
+              </a:rPr>
               <a:t>, </a:t>
             </a:r>
             <a:r>
-              <a:rPr lang="en-US" sz="2800" dirty="0" err="1"/>
+              <a:rPr lang="en-US" sz="2800" dirty="0" err="1">
+                <a:solidFill>
+                  <a:schemeClr val="bg1">
+                    <a:lumMod val="95000"/>
+                  </a:schemeClr>
+                </a:solidFill>
+                <a:latin typeface="Open Sans" panose="020B0606030504020204" pitchFamily="34" charset="0"/>
+                <a:ea typeface="Open Sans" panose="020B0606030504020204" pitchFamily="34" charset="0"/>
+                <a:cs typeface="Open Sans" panose="020B0606030504020204" pitchFamily="34" charset="0"/>
+              </a:rPr>
               <a:t>eget</a:t>
             </a:r>
             <a:r>
-              <a:rPr lang="en-US" sz="2800" dirty="0"/>
+              <a:rPr lang="en-US" sz="2800" dirty="0">
+                <a:solidFill>
+                  <a:schemeClr val="bg1">
+                    <a:lumMod val="95000"/>
+                  </a:schemeClr>
+                </a:solidFill>
+                <a:latin typeface="Open Sans" panose="020B0606030504020204" pitchFamily="34" charset="0"/>
+                <a:ea typeface="Open Sans" panose="020B0606030504020204" pitchFamily="34" charset="0"/>
+                <a:cs typeface="Open Sans" panose="020B0606030504020204" pitchFamily="34" charset="0"/>
+              </a:rPr>
               <a:t> </a:t>
             </a:r>
             <a:r>
-              <a:rPr lang="en-US" sz="2800" dirty="0" err="1"/>
+              <a:rPr lang="en-US" sz="2800" dirty="0" err="1">
+                <a:solidFill>
+                  <a:schemeClr val="bg1">
+                    <a:lumMod val="95000"/>
+                  </a:schemeClr>
+                </a:solidFill>
+                <a:latin typeface="Open Sans" panose="020B0606030504020204" pitchFamily="34" charset="0"/>
+                <a:ea typeface="Open Sans" panose="020B0606030504020204" pitchFamily="34" charset="0"/>
+                <a:cs typeface="Open Sans" panose="020B0606030504020204" pitchFamily="34" charset="0"/>
+              </a:rPr>
               <a:t>suscipit</a:t>
             </a:r>
             <a:r>
-              <a:rPr lang="en-US" sz="2800" dirty="0"/>
+              <a:rPr lang="en-US" sz="2800" dirty="0">
+                <a:solidFill>
+                  <a:schemeClr val="bg1">
+                    <a:lumMod val="95000"/>
+                  </a:schemeClr>
+                </a:solidFill>
+                <a:latin typeface="Open Sans" panose="020B0606030504020204" pitchFamily="34" charset="0"/>
+                <a:ea typeface="Open Sans" panose="020B0606030504020204" pitchFamily="34" charset="0"/>
+                <a:cs typeface="Open Sans" panose="020B0606030504020204" pitchFamily="34" charset="0"/>
+              </a:rPr>
               <a:t> </a:t>
             </a:r>
             <a:r>
-              <a:rPr lang="en-US" sz="2800" dirty="0" err="1"/>
+              <a:rPr lang="en-US" sz="2800" dirty="0" err="1">
+                <a:solidFill>
+                  <a:schemeClr val="bg1">
+                    <a:lumMod val="95000"/>
+                  </a:schemeClr>
+                </a:solidFill>
+                <a:latin typeface="Open Sans" panose="020B0606030504020204" pitchFamily="34" charset="0"/>
+                <a:ea typeface="Open Sans" panose="020B0606030504020204" pitchFamily="34" charset="0"/>
+                <a:cs typeface="Open Sans" panose="020B0606030504020204" pitchFamily="34" charset="0"/>
+              </a:rPr>
               <a:t>nibh</a:t>
             </a:r>
             <a:r>
-              <a:rPr lang="en-US" sz="2800" dirty="0"/>
+              <a:rPr lang="en-US" sz="2800" dirty="0">
+                <a:solidFill>
+                  <a:schemeClr val="bg1">
+                    <a:lumMod val="95000"/>
+                  </a:schemeClr>
+                </a:solidFill>
+                <a:latin typeface="Open Sans" panose="020B0606030504020204" pitchFamily="34" charset="0"/>
+                <a:ea typeface="Open Sans" panose="020B0606030504020204" pitchFamily="34" charset="0"/>
+                <a:cs typeface="Open Sans" panose="020B0606030504020204" pitchFamily="34" charset="0"/>
+              </a:rPr>
               <a:t> </a:t>
             </a:r>
             <a:r>
-              <a:rPr lang="en-US" sz="2800" dirty="0" err="1"/>
+              <a:rPr lang="en-US" sz="2800" dirty="0" err="1">
+                <a:solidFill>
+                  <a:schemeClr val="bg1">
+                    <a:lumMod val="95000"/>
+                  </a:schemeClr>
+                </a:solidFill>
+                <a:latin typeface="Open Sans" panose="020B0606030504020204" pitchFamily="34" charset="0"/>
+                <a:ea typeface="Open Sans" panose="020B0606030504020204" pitchFamily="34" charset="0"/>
+                <a:cs typeface="Open Sans" panose="020B0606030504020204" pitchFamily="34" charset="0"/>
+              </a:rPr>
               <a:t>sapien</a:t>
             </a:r>
             <a:r>
-              <a:rPr lang="en-US" sz="2800" dirty="0"/>
+              <a:rPr lang="en-US" sz="2800" dirty="0">
+                <a:solidFill>
+                  <a:schemeClr val="bg1">
+                    <a:lumMod val="95000"/>
+                  </a:schemeClr>
+                </a:solidFill>
+                <a:latin typeface="Open Sans" panose="020B0606030504020204" pitchFamily="34" charset="0"/>
+                <a:ea typeface="Open Sans" panose="020B0606030504020204" pitchFamily="34" charset="0"/>
+                <a:cs typeface="Open Sans" panose="020B0606030504020204" pitchFamily="34" charset="0"/>
+              </a:rPr>
               <a:t> sit </a:t>
             </a:r>
             <a:r>
-              <a:rPr lang="en-US" sz="2800" dirty="0" err="1"/>
+              <a:rPr lang="en-US" sz="2800" dirty="0" err="1">
+                <a:solidFill>
+                  <a:schemeClr val="bg1">
+                    <a:lumMod val="95000"/>
+                  </a:schemeClr>
+                </a:solidFill>
+                <a:latin typeface="Open Sans" panose="020B0606030504020204" pitchFamily="34" charset="0"/>
+                <a:ea typeface="Open Sans" panose="020B0606030504020204" pitchFamily="34" charset="0"/>
+                <a:cs typeface="Open Sans" panose="020B0606030504020204" pitchFamily="34" charset="0"/>
+              </a:rPr>
               <a:t>amet</a:t>
             </a:r>
             <a:r>
-              <a:rPr lang="en-US" sz="2800" dirty="0"/>
+              <a:rPr lang="en-US" sz="2800" dirty="0">
+                <a:solidFill>
+                  <a:schemeClr val="bg1">
+                    <a:lumMod val="95000"/>
+                  </a:schemeClr>
+                </a:solidFill>
+                <a:latin typeface="Open Sans" panose="020B0606030504020204" pitchFamily="34" charset="0"/>
+                <a:ea typeface="Open Sans" panose="020B0606030504020204" pitchFamily="34" charset="0"/>
+                <a:cs typeface="Open Sans" panose="020B0606030504020204" pitchFamily="34" charset="0"/>
+              </a:rPr>
               <a:t> sem. </a:t>
             </a:r>
             <a:r>
-              <a:rPr lang="en-US" sz="2800" dirty="0" err="1"/>
+              <a:rPr lang="en-US" sz="2800" dirty="0" err="1">
+                <a:solidFill>
+                  <a:schemeClr val="bg1">
+                    <a:lumMod val="95000"/>
+                  </a:schemeClr>
+                </a:solidFill>
+                <a:latin typeface="Open Sans" panose="020B0606030504020204" pitchFamily="34" charset="0"/>
+                <a:ea typeface="Open Sans" panose="020B0606030504020204" pitchFamily="34" charset="0"/>
+                <a:cs typeface="Open Sans" panose="020B0606030504020204" pitchFamily="34" charset="0"/>
+              </a:rPr>
               <a:t>Fusce</a:t>
             </a:r>
             <a:r>
-              <a:rPr lang="en-US" sz="2800" dirty="0"/>
+              <a:rPr lang="en-US" sz="2800" dirty="0">
+                <a:solidFill>
+                  <a:schemeClr val="bg1">
+                    <a:lumMod val="95000"/>
+                  </a:schemeClr>
+                </a:solidFill>
+                <a:latin typeface="Open Sans" panose="020B0606030504020204" pitchFamily="34" charset="0"/>
+                <a:ea typeface="Open Sans" panose="020B0606030504020204" pitchFamily="34" charset="0"/>
+                <a:cs typeface="Open Sans" panose="020B0606030504020204" pitchFamily="34" charset="0"/>
+              </a:rPr>
               <a:t> </a:t>
             </a:r>
             <a:r>
-              <a:rPr lang="en-US" sz="2800" dirty="0" err="1"/>
+              <a:rPr lang="en-US" sz="2800" dirty="0" err="1">
+                <a:solidFill>
+                  <a:schemeClr val="bg1">
+                    <a:lumMod val="95000"/>
+                  </a:schemeClr>
+                </a:solidFill>
+                <a:latin typeface="Open Sans" panose="020B0606030504020204" pitchFamily="34" charset="0"/>
+                <a:ea typeface="Open Sans" panose="020B0606030504020204" pitchFamily="34" charset="0"/>
+                <a:cs typeface="Open Sans" panose="020B0606030504020204" pitchFamily="34" charset="0"/>
+              </a:rPr>
               <a:t>suscipit</a:t>
             </a:r>
             <a:r>
-              <a:rPr lang="en-US" sz="2800" dirty="0"/>
+              <a:rPr lang="en-US" sz="2800" dirty="0">
+                <a:solidFill>
+                  <a:schemeClr val="bg1">
+                    <a:lumMod val="95000"/>
+                  </a:schemeClr>
+                </a:solidFill>
+                <a:latin typeface="Open Sans" panose="020B0606030504020204" pitchFamily="34" charset="0"/>
+                <a:ea typeface="Open Sans" panose="020B0606030504020204" pitchFamily="34" charset="0"/>
+                <a:cs typeface="Open Sans" panose="020B0606030504020204" pitchFamily="34" charset="0"/>
+              </a:rPr>
               <a:t> tempus dolor sit </a:t>
             </a:r>
             <a:r>
-              <a:rPr lang="en-US" sz="2800" dirty="0" err="1"/>
+              <a:rPr lang="en-US" sz="2800" dirty="0" err="1">
+                <a:solidFill>
+                  <a:schemeClr val="bg1">
+                    <a:lumMod val="95000"/>
+                  </a:schemeClr>
+                </a:solidFill>
+                <a:latin typeface="Open Sans" panose="020B0606030504020204" pitchFamily="34" charset="0"/>
+                <a:ea typeface="Open Sans" panose="020B0606030504020204" pitchFamily="34" charset="0"/>
+                <a:cs typeface="Open Sans" panose="020B0606030504020204" pitchFamily="34" charset="0"/>
+              </a:rPr>
               <a:t>amet</a:t>
             </a:r>
             <a:r>
-              <a:rPr lang="en-US" sz="2800" dirty="0"/>
+              <a:rPr lang="en-US" sz="2800" dirty="0">
+                <a:solidFill>
+                  <a:schemeClr val="bg1">
+                    <a:lumMod val="95000"/>
+                  </a:schemeClr>
+                </a:solidFill>
+                <a:latin typeface="Open Sans" panose="020B0606030504020204" pitchFamily="34" charset="0"/>
+                <a:ea typeface="Open Sans" panose="020B0606030504020204" pitchFamily="34" charset="0"/>
+                <a:cs typeface="Open Sans" panose="020B0606030504020204" pitchFamily="34" charset="0"/>
+              </a:rPr>
               <a:t> maximus. In </a:t>
             </a:r>
             <a:r>
-              <a:rPr lang="en-US" sz="2800" dirty="0" err="1"/>
+              <a:rPr lang="en-US" sz="2800" dirty="0" err="1">
+                <a:solidFill>
+                  <a:schemeClr val="bg1">
+                    <a:lumMod val="95000"/>
+                  </a:schemeClr>
+                </a:solidFill>
+                <a:latin typeface="Open Sans" panose="020B0606030504020204" pitchFamily="34" charset="0"/>
+                <a:ea typeface="Open Sans" panose="020B0606030504020204" pitchFamily="34" charset="0"/>
+                <a:cs typeface="Open Sans" panose="020B0606030504020204" pitchFamily="34" charset="0"/>
+              </a:rPr>
               <a:t>quis</a:t>
             </a:r>
             <a:r>
-              <a:rPr lang="en-US" sz="2800" dirty="0"/>
+              <a:rPr lang="en-US" sz="2800" dirty="0">
+                <a:solidFill>
+                  <a:schemeClr val="bg1">
+                    <a:lumMod val="95000"/>
+                  </a:schemeClr>
+                </a:solidFill>
+                <a:latin typeface="Open Sans" panose="020B0606030504020204" pitchFamily="34" charset="0"/>
+                <a:ea typeface="Open Sans" panose="020B0606030504020204" pitchFamily="34" charset="0"/>
+                <a:cs typeface="Open Sans" panose="020B0606030504020204" pitchFamily="34" charset="0"/>
+              </a:rPr>
               <a:t> </a:t>
             </a:r>
             <a:r>
-              <a:rPr lang="en-US" sz="2800" dirty="0" err="1"/>
+              <a:rPr lang="en-US" sz="2800" dirty="0" err="1">
+                <a:solidFill>
+                  <a:schemeClr val="bg1">
+                    <a:lumMod val="95000"/>
+                  </a:schemeClr>
+                </a:solidFill>
+                <a:latin typeface="Open Sans" panose="020B0606030504020204" pitchFamily="34" charset="0"/>
+                <a:ea typeface="Open Sans" panose="020B0606030504020204" pitchFamily="34" charset="0"/>
+                <a:cs typeface="Open Sans" panose="020B0606030504020204" pitchFamily="34" charset="0"/>
+              </a:rPr>
               <a:t>felis</a:t>
             </a:r>
             <a:r>
-              <a:rPr lang="en-US" sz="2800" dirty="0"/>
+              <a:rPr lang="en-US" sz="2800" dirty="0">
+                <a:solidFill>
+                  <a:schemeClr val="bg1">
+                    <a:lumMod val="95000"/>
+                  </a:schemeClr>
+                </a:solidFill>
+                <a:latin typeface="Open Sans" panose="020B0606030504020204" pitchFamily="34" charset="0"/>
+                <a:ea typeface="Open Sans" panose="020B0606030504020204" pitchFamily="34" charset="0"/>
+                <a:cs typeface="Open Sans" panose="020B0606030504020204" pitchFamily="34" charset="0"/>
+              </a:rPr>
               <a:t> </a:t>
             </a:r>
             <a:r>
-              <a:rPr lang="en-US" sz="2800" dirty="0" err="1"/>
+              <a:rPr lang="en-US" sz="2800" dirty="0" err="1">
+                <a:solidFill>
+                  <a:schemeClr val="bg1">
+                    <a:lumMod val="95000"/>
+                  </a:schemeClr>
+                </a:solidFill>
+                <a:latin typeface="Open Sans" panose="020B0606030504020204" pitchFamily="34" charset="0"/>
+                <a:ea typeface="Open Sans" panose="020B0606030504020204" pitchFamily="34" charset="0"/>
+                <a:cs typeface="Open Sans" panose="020B0606030504020204" pitchFamily="34" charset="0"/>
+              </a:rPr>
               <a:t>mattis</a:t>
             </a:r>
             <a:r>
-              <a:rPr lang="en-US" sz="2800" dirty="0"/>
+              <a:rPr lang="en-US" sz="2800" dirty="0">
+                <a:solidFill>
+                  <a:schemeClr val="bg1">
+                    <a:lumMod val="95000"/>
+                  </a:schemeClr>
+                </a:solidFill>
+                <a:latin typeface="Open Sans" panose="020B0606030504020204" pitchFamily="34" charset="0"/>
+                <a:ea typeface="Open Sans" panose="020B0606030504020204" pitchFamily="34" charset="0"/>
+                <a:cs typeface="Open Sans" panose="020B0606030504020204" pitchFamily="34" charset="0"/>
+              </a:rPr>
               <a:t>, </a:t>
             </a:r>
             <a:r>
-              <a:rPr lang="en-US" sz="2800" dirty="0" err="1"/>
+              <a:rPr lang="en-US" sz="2800" dirty="0" err="1">
+                <a:solidFill>
+                  <a:schemeClr val="bg1">
+                    <a:lumMod val="95000"/>
+                  </a:schemeClr>
+                </a:solidFill>
+                <a:latin typeface="Open Sans" panose="020B0606030504020204" pitchFamily="34" charset="0"/>
+                <a:ea typeface="Open Sans" panose="020B0606030504020204" pitchFamily="34" charset="0"/>
+                <a:cs typeface="Open Sans" panose="020B0606030504020204" pitchFamily="34" charset="0"/>
+              </a:rPr>
               <a:t>facilisis</a:t>
             </a:r>
             <a:r>
-              <a:rPr lang="en-US" sz="2800" dirty="0"/>
+              <a:rPr lang="en-US" sz="2800" dirty="0">
+                <a:solidFill>
+                  <a:schemeClr val="bg1">
+                    <a:lumMod val="95000"/>
+                  </a:schemeClr>
+                </a:solidFill>
+                <a:latin typeface="Open Sans" panose="020B0606030504020204" pitchFamily="34" charset="0"/>
+                <a:ea typeface="Open Sans" panose="020B0606030504020204" pitchFamily="34" charset="0"/>
+                <a:cs typeface="Open Sans" panose="020B0606030504020204" pitchFamily="34" charset="0"/>
+              </a:rPr>
               <a:t> nisi </a:t>
             </a:r>
             <a:r>
-              <a:rPr lang="en-US" sz="2800" dirty="0" err="1"/>
+              <a:rPr lang="en-US" sz="2800" dirty="0" err="1">
+                <a:solidFill>
+                  <a:schemeClr val="bg1">
+                    <a:lumMod val="95000"/>
+                  </a:schemeClr>
+                </a:solidFill>
+                <a:latin typeface="Open Sans" panose="020B0606030504020204" pitchFamily="34" charset="0"/>
+                <a:ea typeface="Open Sans" panose="020B0606030504020204" pitchFamily="34" charset="0"/>
+                <a:cs typeface="Open Sans" panose="020B0606030504020204" pitchFamily="34" charset="0"/>
+              </a:rPr>
               <a:t>quis</a:t>
             </a:r>
             <a:r>
-              <a:rPr lang="en-US" sz="2800" dirty="0"/>
+              <a:rPr lang="en-US" sz="2800" dirty="0">
+                <a:solidFill>
+                  <a:schemeClr val="bg1">
+                    <a:lumMod val="95000"/>
+                  </a:schemeClr>
+                </a:solidFill>
+                <a:latin typeface="Open Sans" panose="020B0606030504020204" pitchFamily="34" charset="0"/>
+                <a:ea typeface="Open Sans" panose="020B0606030504020204" pitchFamily="34" charset="0"/>
+                <a:cs typeface="Open Sans" panose="020B0606030504020204" pitchFamily="34" charset="0"/>
+              </a:rPr>
               <a:t>, </a:t>
             </a:r>
             <a:r>
-              <a:rPr lang="en-US" sz="2800" dirty="0" err="1"/>
+              <a:rPr lang="en-US" sz="2800" dirty="0" err="1">
+                <a:solidFill>
+                  <a:schemeClr val="bg1">
+                    <a:lumMod val="95000"/>
+                  </a:schemeClr>
+                </a:solidFill>
+                <a:latin typeface="Open Sans" panose="020B0606030504020204" pitchFamily="34" charset="0"/>
+                <a:ea typeface="Open Sans" panose="020B0606030504020204" pitchFamily="34" charset="0"/>
+                <a:cs typeface="Open Sans" panose="020B0606030504020204" pitchFamily="34" charset="0"/>
+              </a:rPr>
               <a:t>faucibus</a:t>
             </a:r>
             <a:r>
-              <a:rPr lang="en-US" sz="2800" dirty="0"/>
+              <a:rPr lang="en-US" sz="2800" dirty="0">
+                <a:solidFill>
+                  <a:schemeClr val="bg1">
+                    <a:lumMod val="95000"/>
+                  </a:schemeClr>
+                </a:solidFill>
+                <a:latin typeface="Open Sans" panose="020B0606030504020204" pitchFamily="34" charset="0"/>
+                <a:ea typeface="Open Sans" panose="020B0606030504020204" pitchFamily="34" charset="0"/>
+                <a:cs typeface="Open Sans" panose="020B0606030504020204" pitchFamily="34" charset="0"/>
+              </a:rPr>
               <a:t> ante. </a:t>
             </a:r>
             <a:r>
-              <a:rPr lang="en-US" sz="2800" dirty="0" err="1"/>
+              <a:rPr lang="en-US" sz="2800" dirty="0" err="1">
+                <a:solidFill>
+                  <a:schemeClr val="bg1">
+                    <a:lumMod val="95000"/>
+                  </a:schemeClr>
+                </a:solidFill>
+                <a:latin typeface="Open Sans" panose="020B0606030504020204" pitchFamily="34" charset="0"/>
+                <a:ea typeface="Open Sans" panose="020B0606030504020204" pitchFamily="34" charset="0"/>
+                <a:cs typeface="Open Sans" panose="020B0606030504020204" pitchFamily="34" charset="0"/>
+              </a:rPr>
               <a:t>Aenean</a:t>
             </a:r>
             <a:r>
-              <a:rPr lang="en-US" sz="2800" dirty="0"/>
+              <a:rPr lang="en-US" sz="2800" dirty="0">
+                <a:solidFill>
+                  <a:schemeClr val="bg1">
+                    <a:lumMod val="95000"/>
+                  </a:schemeClr>
+                </a:solidFill>
+                <a:latin typeface="Open Sans" panose="020B0606030504020204" pitchFamily="34" charset="0"/>
+                <a:ea typeface="Open Sans" panose="020B0606030504020204" pitchFamily="34" charset="0"/>
+                <a:cs typeface="Open Sans" panose="020B0606030504020204" pitchFamily="34" charset="0"/>
+              </a:rPr>
               <a:t> </a:t>
             </a:r>
             <a:r>
-              <a:rPr lang="en-US" sz="2800" dirty="0" err="1"/>
+              <a:rPr lang="en-US" sz="2800" dirty="0" err="1">
+                <a:solidFill>
+                  <a:schemeClr val="bg1">
+                    <a:lumMod val="95000"/>
+                  </a:schemeClr>
+                </a:solidFill>
+                <a:latin typeface="Open Sans" panose="020B0606030504020204" pitchFamily="34" charset="0"/>
+                <a:ea typeface="Open Sans" panose="020B0606030504020204" pitchFamily="34" charset="0"/>
+                <a:cs typeface="Open Sans" panose="020B0606030504020204" pitchFamily="34" charset="0"/>
+              </a:rPr>
               <a:t>eu</a:t>
             </a:r>
             <a:r>
-              <a:rPr lang="en-US" sz="2800" dirty="0"/>
+              <a:rPr lang="en-US" sz="2800" dirty="0">
+                <a:solidFill>
+                  <a:schemeClr val="bg1">
+                    <a:lumMod val="95000"/>
+                  </a:schemeClr>
+                </a:solidFill>
+                <a:latin typeface="Open Sans" panose="020B0606030504020204" pitchFamily="34" charset="0"/>
+                <a:ea typeface="Open Sans" panose="020B0606030504020204" pitchFamily="34" charset="0"/>
+                <a:cs typeface="Open Sans" panose="020B0606030504020204" pitchFamily="34" charset="0"/>
+              </a:rPr>
               <a:t> </a:t>
             </a:r>
             <a:r>
-              <a:rPr lang="en-US" sz="2800" dirty="0" err="1"/>
+              <a:rPr lang="en-US" sz="2800" dirty="0" err="1">
+                <a:solidFill>
+                  <a:schemeClr val="bg1">
+                    <a:lumMod val="95000"/>
+                  </a:schemeClr>
+                </a:solidFill>
+                <a:latin typeface="Open Sans" panose="020B0606030504020204" pitchFamily="34" charset="0"/>
+                <a:ea typeface="Open Sans" panose="020B0606030504020204" pitchFamily="34" charset="0"/>
+                <a:cs typeface="Open Sans" panose="020B0606030504020204" pitchFamily="34" charset="0"/>
+              </a:rPr>
               <a:t>velit</a:t>
             </a:r>
             <a:r>
-              <a:rPr lang="en-US" sz="2800" dirty="0"/>
+              <a:rPr lang="en-US" sz="2800" dirty="0">
+                <a:solidFill>
+                  <a:schemeClr val="bg1">
+                    <a:lumMod val="95000"/>
+                  </a:schemeClr>
+                </a:solidFill>
+                <a:latin typeface="Open Sans" panose="020B0606030504020204" pitchFamily="34" charset="0"/>
+                <a:ea typeface="Open Sans" panose="020B0606030504020204" pitchFamily="34" charset="0"/>
+                <a:cs typeface="Open Sans" panose="020B0606030504020204" pitchFamily="34" charset="0"/>
+              </a:rPr>
               <a:t> </a:t>
             </a:r>
             <a:r>
-              <a:rPr lang="en-US" sz="2800" dirty="0" err="1"/>
+              <a:rPr lang="en-US" sz="2800" dirty="0" err="1">
+                <a:solidFill>
+                  <a:schemeClr val="bg1">
+                    <a:lumMod val="95000"/>
+                  </a:schemeClr>
+                </a:solidFill>
+                <a:latin typeface="Open Sans" panose="020B0606030504020204" pitchFamily="34" charset="0"/>
+                <a:ea typeface="Open Sans" panose="020B0606030504020204" pitchFamily="34" charset="0"/>
+                <a:cs typeface="Open Sans" panose="020B0606030504020204" pitchFamily="34" charset="0"/>
+              </a:rPr>
               <a:t>augue</a:t>
             </a:r>
             <a:r>
-              <a:rPr lang="en-US" sz="2800" dirty="0"/>
+              <a:rPr lang="en-US" sz="2800" dirty="0">
+                <a:solidFill>
+                  <a:schemeClr val="bg1">
+                    <a:lumMod val="95000"/>
+                  </a:schemeClr>
+                </a:solidFill>
+                <a:latin typeface="Open Sans" panose="020B0606030504020204" pitchFamily="34" charset="0"/>
+                <a:ea typeface="Open Sans" panose="020B0606030504020204" pitchFamily="34" charset="0"/>
+                <a:cs typeface="Open Sans" panose="020B0606030504020204" pitchFamily="34" charset="0"/>
+              </a:rPr>
               <a:t>. Maecenas id </a:t>
             </a:r>
             <a:r>
-              <a:rPr lang="en-US" sz="2800" dirty="0" err="1"/>
+              <a:rPr lang="en-US" sz="2800" dirty="0" err="1">
+                <a:solidFill>
+                  <a:schemeClr val="bg1">
+                    <a:lumMod val="95000"/>
+                  </a:schemeClr>
+                </a:solidFill>
+                <a:latin typeface="Open Sans" panose="020B0606030504020204" pitchFamily="34" charset="0"/>
+                <a:ea typeface="Open Sans" panose="020B0606030504020204" pitchFamily="34" charset="0"/>
+                <a:cs typeface="Open Sans" panose="020B0606030504020204" pitchFamily="34" charset="0"/>
+              </a:rPr>
               <a:t>luctus</a:t>
             </a:r>
             <a:r>
-              <a:rPr lang="en-US" sz="2800" dirty="0"/>
+              <a:rPr lang="en-US" sz="2800" dirty="0">
+                <a:solidFill>
+                  <a:schemeClr val="bg1">
+                    <a:lumMod val="95000"/>
+                  </a:schemeClr>
+                </a:solidFill>
+                <a:latin typeface="Open Sans" panose="020B0606030504020204" pitchFamily="34" charset="0"/>
+                <a:ea typeface="Open Sans" panose="020B0606030504020204" pitchFamily="34" charset="0"/>
+                <a:cs typeface="Open Sans" panose="020B0606030504020204" pitchFamily="34" charset="0"/>
+              </a:rPr>
               <a:t> </a:t>
             </a:r>
             <a:r>
-              <a:rPr lang="en-US" sz="2800" dirty="0" err="1"/>
+              <a:rPr lang="en-US" sz="2800" dirty="0" err="1">
+                <a:solidFill>
+                  <a:schemeClr val="bg1">
+                    <a:lumMod val="95000"/>
+                  </a:schemeClr>
+                </a:solidFill>
+                <a:latin typeface="Open Sans" panose="020B0606030504020204" pitchFamily="34" charset="0"/>
+                <a:ea typeface="Open Sans" panose="020B0606030504020204" pitchFamily="34" charset="0"/>
+                <a:cs typeface="Open Sans" panose="020B0606030504020204" pitchFamily="34" charset="0"/>
+              </a:rPr>
               <a:t>velit</a:t>
             </a:r>
             <a:r>
-              <a:rPr lang="en-US" sz="2800" dirty="0"/>
+              <a:rPr lang="en-US" sz="2800" dirty="0">
+                <a:solidFill>
+                  <a:schemeClr val="bg1">
+                    <a:lumMod val="95000"/>
+                  </a:schemeClr>
+                </a:solidFill>
+                <a:latin typeface="Open Sans" panose="020B0606030504020204" pitchFamily="34" charset="0"/>
+                <a:ea typeface="Open Sans" panose="020B0606030504020204" pitchFamily="34" charset="0"/>
+                <a:cs typeface="Open Sans" panose="020B0606030504020204" pitchFamily="34" charset="0"/>
+              </a:rPr>
               <a:t>, a </a:t>
             </a:r>
             <a:r>
-              <a:rPr lang="en-US" sz="2800" dirty="0" err="1"/>
+              <a:rPr lang="en-US" sz="2800" dirty="0" err="1">
+                <a:solidFill>
+                  <a:schemeClr val="bg1">
+                    <a:lumMod val="95000"/>
+                  </a:schemeClr>
+                </a:solidFill>
+                <a:latin typeface="Open Sans" panose="020B0606030504020204" pitchFamily="34" charset="0"/>
+                <a:ea typeface="Open Sans" panose="020B0606030504020204" pitchFamily="34" charset="0"/>
+                <a:cs typeface="Open Sans" panose="020B0606030504020204" pitchFamily="34" charset="0"/>
+              </a:rPr>
               <a:t>iaculis</a:t>
             </a:r>
             <a:r>
-              <a:rPr lang="en-US" sz="2800" dirty="0"/>
+              <a:rPr lang="en-US" sz="2800" dirty="0">
+                <a:solidFill>
+                  <a:schemeClr val="bg1">
+                    <a:lumMod val="95000"/>
+                  </a:schemeClr>
+                </a:solidFill>
+                <a:latin typeface="Open Sans" panose="020B0606030504020204" pitchFamily="34" charset="0"/>
+                <a:ea typeface="Open Sans" panose="020B0606030504020204" pitchFamily="34" charset="0"/>
+                <a:cs typeface="Open Sans" panose="020B0606030504020204" pitchFamily="34" charset="0"/>
+              </a:rPr>
               <a:t> </a:t>
             </a:r>
             <a:r>
-              <a:rPr lang="en-US" sz="2800" dirty="0" err="1"/>
+              <a:rPr lang="en-US" sz="2800" dirty="0" err="1">
+                <a:solidFill>
+                  <a:schemeClr val="bg1">
+                    <a:lumMod val="95000"/>
+                  </a:schemeClr>
+                </a:solidFill>
+                <a:latin typeface="Open Sans" panose="020B0606030504020204" pitchFamily="34" charset="0"/>
+                <a:ea typeface="Open Sans" panose="020B0606030504020204" pitchFamily="34" charset="0"/>
+                <a:cs typeface="Open Sans" panose="020B0606030504020204" pitchFamily="34" charset="0"/>
+              </a:rPr>
               <a:t>purus</a:t>
             </a:r>
             <a:r>
-              <a:rPr lang="en-US" sz="2800" dirty="0"/>
+              <a:rPr lang="en-US" sz="2800" dirty="0">
+                <a:solidFill>
+                  <a:schemeClr val="bg1">
+                    <a:lumMod val="95000"/>
+                  </a:schemeClr>
+                </a:solidFill>
+                <a:latin typeface="Open Sans" panose="020B0606030504020204" pitchFamily="34" charset="0"/>
+                <a:ea typeface="Open Sans" panose="020B0606030504020204" pitchFamily="34" charset="0"/>
+                <a:cs typeface="Open Sans" panose="020B0606030504020204" pitchFamily="34" charset="0"/>
+              </a:rPr>
               <a:t>. Duis </a:t>
             </a:r>
             <a:r>
-              <a:rPr lang="en-US" sz="2800" dirty="0" err="1"/>
+              <a:rPr lang="en-US" sz="2800" dirty="0" err="1">
+                <a:solidFill>
+                  <a:schemeClr val="bg1">
+                    <a:lumMod val="95000"/>
+                  </a:schemeClr>
+                </a:solidFill>
+                <a:latin typeface="Open Sans" panose="020B0606030504020204" pitchFamily="34" charset="0"/>
+                <a:ea typeface="Open Sans" panose="020B0606030504020204" pitchFamily="34" charset="0"/>
+                <a:cs typeface="Open Sans" panose="020B0606030504020204" pitchFamily="34" charset="0"/>
+              </a:rPr>
               <a:t>nec</a:t>
             </a:r>
             <a:r>
-              <a:rPr lang="en-US" sz="2800" dirty="0"/>
+              <a:rPr lang="en-US" sz="2800" dirty="0">
+                <a:solidFill>
+                  <a:schemeClr val="bg1">
+                    <a:lumMod val="95000"/>
+                  </a:schemeClr>
+                </a:solidFill>
+                <a:latin typeface="Open Sans" panose="020B0606030504020204" pitchFamily="34" charset="0"/>
+                <a:ea typeface="Open Sans" panose="020B0606030504020204" pitchFamily="34" charset="0"/>
+                <a:cs typeface="Open Sans" panose="020B0606030504020204" pitchFamily="34" charset="0"/>
+              </a:rPr>
               <a:t> libero dictum, </a:t>
             </a:r>
             <a:r>
-              <a:rPr lang="en-US" sz="2800" dirty="0" err="1"/>
+              <a:rPr lang="en-US" sz="2800" dirty="0" err="1">
+                <a:solidFill>
+                  <a:schemeClr val="bg1">
+                    <a:lumMod val="95000"/>
+                  </a:schemeClr>
+                </a:solidFill>
+                <a:latin typeface="Open Sans" panose="020B0606030504020204" pitchFamily="34" charset="0"/>
+                <a:ea typeface="Open Sans" panose="020B0606030504020204" pitchFamily="34" charset="0"/>
+                <a:cs typeface="Open Sans" panose="020B0606030504020204" pitchFamily="34" charset="0"/>
+              </a:rPr>
               <a:t>luctus</a:t>
             </a:r>
             <a:r>
-              <a:rPr lang="en-US" sz="2800" dirty="0"/>
+              <a:rPr lang="en-US" sz="2800" dirty="0">
+                <a:solidFill>
+                  <a:schemeClr val="bg1">
+                    <a:lumMod val="95000"/>
+                  </a:schemeClr>
+                </a:solidFill>
+                <a:latin typeface="Open Sans" panose="020B0606030504020204" pitchFamily="34" charset="0"/>
+                <a:ea typeface="Open Sans" panose="020B0606030504020204" pitchFamily="34" charset="0"/>
+                <a:cs typeface="Open Sans" panose="020B0606030504020204" pitchFamily="34" charset="0"/>
+              </a:rPr>
               <a:t> </a:t>
             </a:r>
             <a:r>
-              <a:rPr lang="en-US" sz="2800" dirty="0" err="1"/>
+              <a:rPr lang="en-US" sz="2800" dirty="0" err="1">
+                <a:solidFill>
+                  <a:schemeClr val="bg1">
+                    <a:lumMod val="95000"/>
+                  </a:schemeClr>
+                </a:solidFill>
+                <a:latin typeface="Open Sans" panose="020B0606030504020204" pitchFamily="34" charset="0"/>
+                <a:ea typeface="Open Sans" panose="020B0606030504020204" pitchFamily="34" charset="0"/>
+                <a:cs typeface="Open Sans" panose="020B0606030504020204" pitchFamily="34" charset="0"/>
+              </a:rPr>
               <a:t>nulla</a:t>
             </a:r>
             <a:r>
-              <a:rPr lang="en-US" sz="2800" dirty="0"/>
+              <a:rPr lang="en-US" sz="2800" dirty="0">
+                <a:solidFill>
+                  <a:schemeClr val="bg1">
+                    <a:lumMod val="95000"/>
+                  </a:schemeClr>
+                </a:solidFill>
+                <a:latin typeface="Open Sans" panose="020B0606030504020204" pitchFamily="34" charset="0"/>
+                <a:ea typeface="Open Sans" panose="020B0606030504020204" pitchFamily="34" charset="0"/>
+                <a:cs typeface="Open Sans" panose="020B0606030504020204" pitchFamily="34" charset="0"/>
+              </a:rPr>
               <a:t> </a:t>
             </a:r>
             <a:r>
-              <a:rPr lang="en-US" sz="2800" dirty="0" err="1"/>
+              <a:rPr lang="en-US" sz="2800" dirty="0" err="1">
+                <a:solidFill>
+                  <a:schemeClr val="bg1">
+                    <a:lumMod val="95000"/>
+                  </a:schemeClr>
+                </a:solidFill>
+                <a:latin typeface="Open Sans" panose="020B0606030504020204" pitchFamily="34" charset="0"/>
+                <a:ea typeface="Open Sans" panose="020B0606030504020204" pitchFamily="34" charset="0"/>
+                <a:cs typeface="Open Sans" panose="020B0606030504020204" pitchFamily="34" charset="0"/>
+              </a:rPr>
               <a:t>eget</a:t>
             </a:r>
             <a:r>
-              <a:rPr lang="en-US" sz="2800" dirty="0"/>
+              <a:rPr lang="en-US" sz="2800" dirty="0">
+                <a:solidFill>
+                  <a:schemeClr val="bg1">
+                    <a:lumMod val="95000"/>
+                  </a:schemeClr>
+                </a:solidFill>
+                <a:latin typeface="Open Sans" panose="020B0606030504020204" pitchFamily="34" charset="0"/>
+                <a:ea typeface="Open Sans" panose="020B0606030504020204" pitchFamily="34" charset="0"/>
+                <a:cs typeface="Open Sans" panose="020B0606030504020204" pitchFamily="34" charset="0"/>
+              </a:rPr>
               <a:t>, </a:t>
             </a:r>
             <a:r>
-              <a:rPr lang="en-US" sz="2800" dirty="0" err="1"/>
+              <a:rPr lang="en-US" sz="2800" dirty="0" err="1">
+                <a:solidFill>
+                  <a:schemeClr val="bg1">
+                    <a:lumMod val="95000"/>
+                  </a:schemeClr>
+                </a:solidFill>
+                <a:latin typeface="Open Sans" panose="020B0606030504020204" pitchFamily="34" charset="0"/>
+                <a:ea typeface="Open Sans" panose="020B0606030504020204" pitchFamily="34" charset="0"/>
+                <a:cs typeface="Open Sans" panose="020B0606030504020204" pitchFamily="34" charset="0"/>
+              </a:rPr>
               <a:t>mattis</a:t>
             </a:r>
             <a:r>
-              <a:rPr lang="en-US" sz="2800" dirty="0"/>
+              <a:rPr lang="en-US" sz="2800" dirty="0">
+                <a:solidFill>
+                  <a:schemeClr val="bg1">
+                    <a:lumMod val="95000"/>
+                  </a:schemeClr>
+                </a:solidFill>
+                <a:latin typeface="Open Sans" panose="020B0606030504020204" pitchFamily="34" charset="0"/>
+                <a:ea typeface="Open Sans" panose="020B0606030504020204" pitchFamily="34" charset="0"/>
+                <a:cs typeface="Open Sans" panose="020B0606030504020204" pitchFamily="34" charset="0"/>
+              </a:rPr>
               <a:t> ante. </a:t>
             </a:r>
             <a:r>
-              <a:rPr lang="en-US" sz="2800" dirty="0" err="1"/>
+              <a:rPr lang="en-US" sz="2800" dirty="0" err="1">
+                <a:solidFill>
+                  <a:schemeClr val="bg1">
+                    <a:lumMod val="95000"/>
+                  </a:schemeClr>
+                </a:solidFill>
+                <a:latin typeface="Open Sans" panose="020B0606030504020204" pitchFamily="34" charset="0"/>
+                <a:ea typeface="Open Sans" panose="020B0606030504020204" pitchFamily="34" charset="0"/>
+                <a:cs typeface="Open Sans" panose="020B0606030504020204" pitchFamily="34" charset="0"/>
+              </a:rPr>
               <a:t>Curabitur</a:t>
             </a:r>
             <a:r>
-              <a:rPr lang="en-US" sz="2800" dirty="0"/>
+              <a:rPr lang="en-US" sz="2800" dirty="0">
+                <a:solidFill>
+                  <a:schemeClr val="bg1">
+                    <a:lumMod val="95000"/>
+                  </a:schemeClr>
+                </a:solidFill>
+                <a:latin typeface="Open Sans" panose="020B0606030504020204" pitchFamily="34" charset="0"/>
+                <a:ea typeface="Open Sans" panose="020B0606030504020204" pitchFamily="34" charset="0"/>
+                <a:cs typeface="Open Sans" panose="020B0606030504020204" pitchFamily="34" charset="0"/>
+              </a:rPr>
               <a:t> </a:t>
             </a:r>
             <a:r>
-              <a:rPr lang="en-US" sz="2800" dirty="0" err="1"/>
+              <a:rPr lang="en-US" sz="2800" dirty="0" err="1">
+                <a:solidFill>
+                  <a:schemeClr val="bg1">
+                    <a:lumMod val="95000"/>
+                  </a:schemeClr>
+                </a:solidFill>
+                <a:latin typeface="Open Sans" panose="020B0606030504020204" pitchFamily="34" charset="0"/>
+                <a:ea typeface="Open Sans" panose="020B0606030504020204" pitchFamily="34" charset="0"/>
+                <a:cs typeface="Open Sans" panose="020B0606030504020204" pitchFamily="34" charset="0"/>
+              </a:rPr>
               <a:t>sollicitudin</a:t>
             </a:r>
             <a:r>
-              <a:rPr lang="en-US" sz="2800" dirty="0"/>
+              <a:rPr lang="en-US" sz="2800" dirty="0">
+                <a:solidFill>
+                  <a:schemeClr val="bg1">
+                    <a:lumMod val="95000"/>
+                  </a:schemeClr>
+                </a:solidFill>
+                <a:latin typeface="Open Sans" panose="020B0606030504020204" pitchFamily="34" charset="0"/>
+                <a:ea typeface="Open Sans" panose="020B0606030504020204" pitchFamily="34" charset="0"/>
+                <a:cs typeface="Open Sans" panose="020B0606030504020204" pitchFamily="34" charset="0"/>
+              </a:rPr>
               <a:t> </a:t>
             </a:r>
             <a:r>
-              <a:rPr lang="en-US" sz="2800" dirty="0" err="1"/>
+              <a:rPr lang="en-US" sz="2800" dirty="0" err="1">
+                <a:solidFill>
+                  <a:schemeClr val="bg1">
+                    <a:lumMod val="95000"/>
+                  </a:schemeClr>
+                </a:solidFill>
+                <a:latin typeface="Open Sans" panose="020B0606030504020204" pitchFamily="34" charset="0"/>
+                <a:ea typeface="Open Sans" panose="020B0606030504020204" pitchFamily="34" charset="0"/>
+                <a:cs typeface="Open Sans" panose="020B0606030504020204" pitchFamily="34" charset="0"/>
+              </a:rPr>
               <a:t>nisl</a:t>
             </a:r>
             <a:r>
-              <a:rPr lang="en-US" sz="2800" dirty="0"/>
+              <a:rPr lang="en-US" sz="2800" dirty="0">
+                <a:solidFill>
+                  <a:schemeClr val="bg1">
+                    <a:lumMod val="95000"/>
+                  </a:schemeClr>
+                </a:solidFill>
+                <a:latin typeface="Open Sans" panose="020B0606030504020204" pitchFamily="34" charset="0"/>
+                <a:ea typeface="Open Sans" panose="020B0606030504020204" pitchFamily="34" charset="0"/>
+                <a:cs typeface="Open Sans" panose="020B0606030504020204" pitchFamily="34" charset="0"/>
+              </a:rPr>
               <a:t> </a:t>
             </a:r>
             <a:r>
-              <a:rPr lang="en-US" sz="2800" dirty="0" err="1"/>
+              <a:rPr lang="en-US" sz="2800" dirty="0" err="1">
+                <a:solidFill>
+                  <a:schemeClr val="bg1">
+                    <a:lumMod val="95000"/>
+                  </a:schemeClr>
+                </a:solidFill>
+                <a:latin typeface="Open Sans" panose="020B0606030504020204" pitchFamily="34" charset="0"/>
+                <a:ea typeface="Open Sans" panose="020B0606030504020204" pitchFamily="34" charset="0"/>
+                <a:cs typeface="Open Sans" panose="020B0606030504020204" pitchFamily="34" charset="0"/>
+              </a:rPr>
               <a:t>nunc</a:t>
             </a:r>
             <a:r>
-              <a:rPr lang="en-US" sz="2800" dirty="0"/>
+              <a:rPr lang="en-US" sz="2800" dirty="0">
+                <a:solidFill>
+                  <a:schemeClr val="bg1">
+                    <a:lumMod val="95000"/>
+                  </a:schemeClr>
+                </a:solidFill>
+                <a:latin typeface="Open Sans" panose="020B0606030504020204" pitchFamily="34" charset="0"/>
+                <a:ea typeface="Open Sans" panose="020B0606030504020204" pitchFamily="34" charset="0"/>
+                <a:cs typeface="Open Sans" panose="020B0606030504020204" pitchFamily="34" charset="0"/>
+              </a:rPr>
               <a:t>, sit </a:t>
             </a:r>
             <a:r>
-              <a:rPr lang="en-US" sz="2800" dirty="0" err="1"/>
+              <a:rPr lang="en-US" sz="2800" dirty="0" err="1">
+                <a:solidFill>
+                  <a:schemeClr val="bg1">
+                    <a:lumMod val="95000"/>
+                  </a:schemeClr>
+                </a:solidFill>
+                <a:latin typeface="Open Sans" panose="020B0606030504020204" pitchFamily="34" charset="0"/>
+                <a:ea typeface="Open Sans" panose="020B0606030504020204" pitchFamily="34" charset="0"/>
+                <a:cs typeface="Open Sans" panose="020B0606030504020204" pitchFamily="34" charset="0"/>
+              </a:rPr>
               <a:t>amet</a:t>
             </a:r>
             <a:r>
-              <a:rPr lang="en-US" sz="2800" dirty="0"/>
+              <a:rPr lang="en-US" sz="2800" dirty="0">
+                <a:solidFill>
+                  <a:schemeClr val="bg1">
+                    <a:lumMod val="95000"/>
+                  </a:schemeClr>
+                </a:solidFill>
+                <a:latin typeface="Open Sans" panose="020B0606030504020204" pitchFamily="34" charset="0"/>
+                <a:ea typeface="Open Sans" panose="020B0606030504020204" pitchFamily="34" charset="0"/>
+                <a:cs typeface="Open Sans" panose="020B0606030504020204" pitchFamily="34" charset="0"/>
+              </a:rPr>
               <a:t> </a:t>
             </a:r>
             <a:r>
-              <a:rPr lang="en-US" sz="2800" dirty="0" err="1"/>
+              <a:rPr lang="en-US" sz="2800" dirty="0" err="1">
+                <a:solidFill>
+                  <a:schemeClr val="bg1">
+                    <a:lumMod val="95000"/>
+                  </a:schemeClr>
+                </a:solidFill>
+                <a:latin typeface="Open Sans" panose="020B0606030504020204" pitchFamily="34" charset="0"/>
+                <a:ea typeface="Open Sans" panose="020B0606030504020204" pitchFamily="34" charset="0"/>
+                <a:cs typeface="Open Sans" panose="020B0606030504020204" pitchFamily="34" charset="0"/>
+              </a:rPr>
               <a:t>eleifend</a:t>
             </a:r>
             <a:r>
-              <a:rPr lang="en-US" sz="2800" dirty="0"/>
+              <a:rPr lang="en-US" sz="2800" dirty="0">
+                <a:solidFill>
+                  <a:schemeClr val="bg1">
+                    <a:lumMod val="95000"/>
+                  </a:schemeClr>
+                </a:solidFill>
+                <a:latin typeface="Open Sans" panose="020B0606030504020204" pitchFamily="34" charset="0"/>
+                <a:ea typeface="Open Sans" panose="020B0606030504020204" pitchFamily="34" charset="0"/>
+                <a:cs typeface="Open Sans" panose="020B0606030504020204" pitchFamily="34" charset="0"/>
+              </a:rPr>
               <a:t> ipsum </a:t>
             </a:r>
             <a:r>
-              <a:rPr lang="en-US" sz="2800" dirty="0" err="1"/>
+              <a:rPr lang="en-US" sz="2800" dirty="0" err="1">
+                <a:solidFill>
+                  <a:schemeClr val="bg1">
+                    <a:lumMod val="95000"/>
+                  </a:schemeClr>
+                </a:solidFill>
+                <a:latin typeface="Open Sans" panose="020B0606030504020204" pitchFamily="34" charset="0"/>
+                <a:ea typeface="Open Sans" panose="020B0606030504020204" pitchFamily="34" charset="0"/>
+                <a:cs typeface="Open Sans" panose="020B0606030504020204" pitchFamily="34" charset="0"/>
+              </a:rPr>
               <a:t>pellentesque</a:t>
             </a:r>
             <a:r>
-              <a:rPr lang="en-US" sz="2800" dirty="0"/>
+              <a:rPr lang="en-US" sz="2800" dirty="0">
+                <a:solidFill>
+                  <a:schemeClr val="bg1">
+                    <a:lumMod val="95000"/>
+                  </a:schemeClr>
+                </a:solidFill>
+                <a:latin typeface="Open Sans" panose="020B0606030504020204" pitchFamily="34" charset="0"/>
+                <a:ea typeface="Open Sans" panose="020B0606030504020204" pitchFamily="34" charset="0"/>
+                <a:cs typeface="Open Sans" panose="020B0606030504020204" pitchFamily="34" charset="0"/>
+              </a:rPr>
               <a:t> sit </a:t>
             </a:r>
             <a:r>
-              <a:rPr lang="en-US" sz="2800" dirty="0" err="1"/>
+              <a:rPr lang="en-US" sz="2800" dirty="0" err="1">
+                <a:solidFill>
+                  <a:schemeClr val="bg1">
+                    <a:lumMod val="95000"/>
+                  </a:schemeClr>
+                </a:solidFill>
+                <a:latin typeface="Open Sans" panose="020B0606030504020204" pitchFamily="34" charset="0"/>
+                <a:ea typeface="Open Sans" panose="020B0606030504020204" pitchFamily="34" charset="0"/>
+                <a:cs typeface="Open Sans" panose="020B0606030504020204" pitchFamily="34" charset="0"/>
+              </a:rPr>
               <a:t>amet</a:t>
             </a:r>
             <a:r>
-              <a:rPr lang="en-US" sz="2800" dirty="0"/>
+              <a:rPr lang="en-US" sz="2800" dirty="0">
+                <a:solidFill>
+                  <a:schemeClr val="bg1">
+                    <a:lumMod val="95000"/>
+                  </a:schemeClr>
+                </a:solidFill>
+                <a:latin typeface="Open Sans" panose="020B0606030504020204" pitchFamily="34" charset="0"/>
+                <a:ea typeface="Open Sans" panose="020B0606030504020204" pitchFamily="34" charset="0"/>
+                <a:cs typeface="Open Sans" panose="020B0606030504020204" pitchFamily="34" charset="0"/>
+              </a:rPr>
               <a:t>. Duis </a:t>
             </a:r>
             <a:r>
-              <a:rPr lang="en-US" sz="2800" dirty="0" err="1"/>
+              <a:rPr lang="en-US" sz="2800" dirty="0" err="1">
+                <a:solidFill>
+                  <a:schemeClr val="bg1">
+                    <a:lumMod val="95000"/>
+                  </a:schemeClr>
+                </a:solidFill>
+                <a:latin typeface="Open Sans" panose="020B0606030504020204" pitchFamily="34" charset="0"/>
+                <a:ea typeface="Open Sans" panose="020B0606030504020204" pitchFamily="34" charset="0"/>
+                <a:cs typeface="Open Sans" panose="020B0606030504020204" pitchFamily="34" charset="0"/>
+              </a:rPr>
               <a:t>iaculis</a:t>
             </a:r>
             <a:r>
-              <a:rPr lang="en-US" sz="2800" dirty="0"/>
+              <a:rPr lang="en-US" sz="2800" dirty="0">
+                <a:solidFill>
+                  <a:schemeClr val="bg1">
+                    <a:lumMod val="95000"/>
+                  </a:schemeClr>
+                </a:solidFill>
+                <a:latin typeface="Open Sans" panose="020B0606030504020204" pitchFamily="34" charset="0"/>
+                <a:ea typeface="Open Sans" panose="020B0606030504020204" pitchFamily="34" charset="0"/>
+                <a:cs typeface="Open Sans" panose="020B0606030504020204" pitchFamily="34" charset="0"/>
+              </a:rPr>
               <a:t>, libero </a:t>
             </a:r>
             <a:r>
-              <a:rPr lang="en-US" sz="2800" dirty="0" err="1"/>
+              <a:rPr lang="en-US" sz="2800" dirty="0" err="1">
+                <a:solidFill>
+                  <a:schemeClr val="bg1">
+                    <a:lumMod val="95000"/>
+                  </a:schemeClr>
+                </a:solidFill>
+                <a:latin typeface="Open Sans" panose="020B0606030504020204" pitchFamily="34" charset="0"/>
+                <a:ea typeface="Open Sans" panose="020B0606030504020204" pitchFamily="34" charset="0"/>
+                <a:cs typeface="Open Sans" panose="020B0606030504020204" pitchFamily="34" charset="0"/>
+              </a:rPr>
               <a:t>imperdiet</a:t>
             </a:r>
             <a:r>
-              <a:rPr lang="en-US" sz="2800" dirty="0"/>
+              <a:rPr lang="en-US" sz="2800" dirty="0">
+                <a:solidFill>
+                  <a:schemeClr val="bg1">
+                    <a:lumMod val="95000"/>
+                  </a:schemeClr>
+                </a:solidFill>
+                <a:latin typeface="Open Sans" panose="020B0606030504020204" pitchFamily="34" charset="0"/>
+                <a:ea typeface="Open Sans" panose="020B0606030504020204" pitchFamily="34" charset="0"/>
+                <a:cs typeface="Open Sans" panose="020B0606030504020204" pitchFamily="34" charset="0"/>
+              </a:rPr>
               <a:t> </a:t>
             </a:r>
             <a:r>
-              <a:rPr lang="en-US" sz="2800" dirty="0" err="1"/>
+              <a:rPr lang="en-US" sz="2800" dirty="0" err="1">
+                <a:solidFill>
+                  <a:schemeClr val="bg1">
+                    <a:lumMod val="95000"/>
+                  </a:schemeClr>
+                </a:solidFill>
+                <a:latin typeface="Open Sans" panose="020B0606030504020204" pitchFamily="34" charset="0"/>
+                <a:ea typeface="Open Sans" panose="020B0606030504020204" pitchFamily="34" charset="0"/>
+                <a:cs typeface="Open Sans" panose="020B0606030504020204" pitchFamily="34" charset="0"/>
+              </a:rPr>
               <a:t>rutrum</a:t>
             </a:r>
             <a:r>
-              <a:rPr lang="en-US" sz="2800" dirty="0"/>
+              <a:rPr lang="en-US" sz="2800" dirty="0">
+                <a:solidFill>
+                  <a:schemeClr val="bg1">
+                    <a:lumMod val="95000"/>
+                  </a:schemeClr>
+                </a:solidFill>
+                <a:latin typeface="Open Sans" panose="020B0606030504020204" pitchFamily="34" charset="0"/>
+                <a:ea typeface="Open Sans" panose="020B0606030504020204" pitchFamily="34" charset="0"/>
+                <a:cs typeface="Open Sans" panose="020B0606030504020204" pitchFamily="34" charset="0"/>
+              </a:rPr>
               <a:t> </a:t>
             </a:r>
             <a:r>
-              <a:rPr lang="en-US" sz="2800" dirty="0" err="1"/>
+              <a:rPr lang="en-US" sz="2800" dirty="0" err="1">
+                <a:solidFill>
+                  <a:schemeClr val="bg1">
+                    <a:lumMod val="95000"/>
+                  </a:schemeClr>
+                </a:solidFill>
+                <a:latin typeface="Open Sans" panose="020B0606030504020204" pitchFamily="34" charset="0"/>
+                <a:ea typeface="Open Sans" panose="020B0606030504020204" pitchFamily="34" charset="0"/>
+                <a:cs typeface="Open Sans" panose="020B0606030504020204" pitchFamily="34" charset="0"/>
+              </a:rPr>
               <a:t>pretium</a:t>
             </a:r>
             <a:r>
-              <a:rPr lang="en-US" sz="2800" dirty="0"/>
+              <a:rPr lang="en-US" sz="2800" dirty="0">
+                <a:solidFill>
+                  <a:schemeClr val="bg1">
+                    <a:lumMod val="95000"/>
+                  </a:schemeClr>
+                </a:solidFill>
+                <a:latin typeface="Open Sans" panose="020B0606030504020204" pitchFamily="34" charset="0"/>
+                <a:ea typeface="Open Sans" panose="020B0606030504020204" pitchFamily="34" charset="0"/>
+                <a:cs typeface="Open Sans" panose="020B0606030504020204" pitchFamily="34" charset="0"/>
+              </a:rPr>
               <a:t>, ligula mi pharetra </a:t>
             </a:r>
             <a:r>
-              <a:rPr lang="en-US" sz="2800" dirty="0" err="1"/>
+              <a:rPr lang="en-US" sz="2800" dirty="0" err="1">
+                <a:solidFill>
+                  <a:schemeClr val="bg1">
+                    <a:lumMod val="95000"/>
+                  </a:schemeClr>
+                </a:solidFill>
+                <a:latin typeface="Open Sans" panose="020B0606030504020204" pitchFamily="34" charset="0"/>
+                <a:ea typeface="Open Sans" panose="020B0606030504020204" pitchFamily="34" charset="0"/>
+                <a:cs typeface="Open Sans" panose="020B0606030504020204" pitchFamily="34" charset="0"/>
+              </a:rPr>
               <a:t>nunc</a:t>
             </a:r>
             <a:r>
-              <a:rPr lang="en-US" sz="2800" dirty="0"/>
+              <a:rPr lang="en-US" sz="2800" dirty="0">
+                <a:solidFill>
+                  <a:schemeClr val="bg1">
+                    <a:lumMod val="95000"/>
+                  </a:schemeClr>
+                </a:solidFill>
+                <a:latin typeface="Open Sans" panose="020B0606030504020204" pitchFamily="34" charset="0"/>
+                <a:ea typeface="Open Sans" panose="020B0606030504020204" pitchFamily="34" charset="0"/>
+                <a:cs typeface="Open Sans" panose="020B0606030504020204" pitchFamily="34" charset="0"/>
+              </a:rPr>
               <a:t>, vitae convallis </a:t>
             </a:r>
             <a:r>
-              <a:rPr lang="en-US" sz="2800" dirty="0" err="1"/>
+              <a:rPr lang="en-US" sz="2800" dirty="0" err="1">
+                <a:solidFill>
+                  <a:schemeClr val="bg1">
+                    <a:lumMod val="95000"/>
+                  </a:schemeClr>
+                </a:solidFill>
+                <a:latin typeface="Open Sans" panose="020B0606030504020204" pitchFamily="34" charset="0"/>
+                <a:ea typeface="Open Sans" panose="020B0606030504020204" pitchFamily="34" charset="0"/>
+                <a:cs typeface="Open Sans" panose="020B0606030504020204" pitchFamily="34" charset="0"/>
+              </a:rPr>
               <a:t>sapien</a:t>
             </a:r>
             <a:r>
-              <a:rPr lang="en-US" sz="2800" dirty="0"/>
+              <a:rPr lang="en-US" sz="2800" dirty="0">
+                <a:solidFill>
+                  <a:schemeClr val="bg1">
+                    <a:lumMod val="95000"/>
+                  </a:schemeClr>
+                </a:solidFill>
+                <a:latin typeface="Open Sans" panose="020B0606030504020204" pitchFamily="34" charset="0"/>
+                <a:ea typeface="Open Sans" panose="020B0606030504020204" pitchFamily="34" charset="0"/>
+                <a:cs typeface="Open Sans" panose="020B0606030504020204" pitchFamily="34" charset="0"/>
+              </a:rPr>
               <a:t> </a:t>
             </a:r>
             <a:r>
-              <a:rPr lang="en-US" sz="2800" dirty="0" err="1"/>
+              <a:rPr lang="en-US" sz="2800" dirty="0" err="1">
+                <a:solidFill>
+                  <a:schemeClr val="bg1">
+                    <a:lumMod val="95000"/>
+                  </a:schemeClr>
+                </a:solidFill>
+                <a:latin typeface="Open Sans" panose="020B0606030504020204" pitchFamily="34" charset="0"/>
+                <a:ea typeface="Open Sans" panose="020B0606030504020204" pitchFamily="34" charset="0"/>
+                <a:cs typeface="Open Sans" panose="020B0606030504020204" pitchFamily="34" charset="0"/>
+              </a:rPr>
               <a:t>justo</a:t>
             </a:r>
             <a:r>
-              <a:rPr lang="en-US" sz="2800" dirty="0"/>
+              <a:rPr lang="en-US" sz="2800" dirty="0">
+                <a:solidFill>
+                  <a:schemeClr val="bg1">
+                    <a:lumMod val="95000"/>
+                  </a:schemeClr>
+                </a:solidFill>
+                <a:latin typeface="Open Sans" panose="020B0606030504020204" pitchFamily="34" charset="0"/>
+                <a:ea typeface="Open Sans" panose="020B0606030504020204" pitchFamily="34" charset="0"/>
+                <a:cs typeface="Open Sans" panose="020B0606030504020204" pitchFamily="34" charset="0"/>
+              </a:rPr>
               <a:t> vitae magna. </a:t>
             </a:r>
             <a:r>
-              <a:rPr lang="en-US" sz="2800" dirty="0" err="1"/>
+              <a:rPr lang="en-US" sz="2800" dirty="0" err="1">
+                <a:solidFill>
+                  <a:schemeClr val="bg1">
+                    <a:lumMod val="95000"/>
+                  </a:schemeClr>
+                </a:solidFill>
+                <a:latin typeface="Open Sans" panose="020B0606030504020204" pitchFamily="34" charset="0"/>
+                <a:ea typeface="Open Sans" panose="020B0606030504020204" pitchFamily="34" charset="0"/>
+                <a:cs typeface="Open Sans" panose="020B0606030504020204" pitchFamily="34" charset="0"/>
+              </a:rPr>
               <a:t>Aliquam</a:t>
             </a:r>
             <a:r>
-              <a:rPr lang="en-US" sz="2800" dirty="0"/>
+              <a:rPr lang="en-US" sz="2800" dirty="0">
+                <a:solidFill>
+                  <a:schemeClr val="bg1">
+                    <a:lumMod val="95000"/>
+                  </a:schemeClr>
+                </a:solidFill>
+                <a:latin typeface="Open Sans" panose="020B0606030504020204" pitchFamily="34" charset="0"/>
+                <a:ea typeface="Open Sans" panose="020B0606030504020204" pitchFamily="34" charset="0"/>
+                <a:cs typeface="Open Sans" panose="020B0606030504020204" pitchFamily="34" charset="0"/>
+              </a:rPr>
               <a:t> </a:t>
             </a:r>
             <a:r>
-              <a:rPr lang="en-US" sz="2800" dirty="0" err="1"/>
+              <a:rPr lang="en-US" sz="2800" dirty="0" err="1">
+                <a:solidFill>
+                  <a:schemeClr val="bg1">
+                    <a:lumMod val="95000"/>
+                  </a:schemeClr>
+                </a:solidFill>
+                <a:latin typeface="Open Sans" panose="020B0606030504020204" pitchFamily="34" charset="0"/>
+                <a:ea typeface="Open Sans" panose="020B0606030504020204" pitchFamily="34" charset="0"/>
+                <a:cs typeface="Open Sans" panose="020B0606030504020204" pitchFamily="34" charset="0"/>
+              </a:rPr>
               <a:t>eget</a:t>
             </a:r>
             <a:r>
-              <a:rPr lang="en-US" sz="2800" dirty="0"/>
+              <a:rPr lang="en-US" sz="2800" dirty="0">
+                <a:solidFill>
+                  <a:schemeClr val="bg1">
+                    <a:lumMod val="95000"/>
+                  </a:schemeClr>
+                </a:solidFill>
+                <a:latin typeface="Open Sans" panose="020B0606030504020204" pitchFamily="34" charset="0"/>
+                <a:ea typeface="Open Sans" panose="020B0606030504020204" pitchFamily="34" charset="0"/>
+                <a:cs typeface="Open Sans" panose="020B0606030504020204" pitchFamily="34" charset="0"/>
+              </a:rPr>
               <a:t> ante ex.</a:t>
             </a:r>
           </a:p>
         </p:txBody>
       </p:sp>
+      <p:pic>
+        <p:nvPicPr>
+          <p:cNvPr id="9" name="Picture 8" descr="White Block W">
+            <a:extLst>
+              <a:ext uri="{FF2B5EF4-FFF2-40B4-BE49-F238E27FC236}">
+                <a16:creationId xmlns:a16="http://schemas.microsoft.com/office/drawing/2014/main" id="{B5B6BDE5-E753-4C19-BAFA-CE5C11063C9D}"/>
+              </a:ext>
+            </a:extLst>
+          </p:cNvPr>
+          <p:cNvPicPr>
+            <a:picLocks noChangeAspect="1"/>
+          </p:cNvPicPr>
+          <p:nvPr/>
+        </p:nvPicPr>
+        <p:blipFill>
+          <a:blip r:embed="rId2">
+            <a:extLst>
+              <a:ext uri="{28A0092B-C50C-407E-A947-70E740481C1C}">
+                <a14:useLocalDpi xmlns:a14="http://schemas.microsoft.com/office/drawing/2010/main" val="0"/>
+              </a:ext>
+            </a:extLst>
+          </a:blip>
+          <a:stretch>
+            <a:fillRect/>
+          </a:stretch>
+        </p:blipFill>
+        <p:spPr>
+          <a:xfrm>
+            <a:off x="39776400" y="247776"/>
+            <a:ext cx="3743611" cy="2529885"/>
+          </a:xfrm>
+          <a:prstGeom prst="rect">
+            <a:avLst/>
+          </a:prstGeom>
+        </p:spPr>
+      </p:pic>
     </p:spTree>
     <p:extLst>
       <p:ext uri="{BB962C8B-B14F-4D97-AF65-F5344CB8AC3E}">

</xml_diff>

<commit_message>
Poster - Adding images, cleaning up format.
</commit_message>
<xml_diff>
--- a/devdocs/EnvNoiseDetectorPosterExample.pptx
+++ b/devdocs/EnvNoiseDetectorPosterExample.pptx
@@ -283,7 +283,7 @@
           <a:p>
             <a:fld id="{E153FC24-88DC-4CE4-A3C2-9F31CD4F9CE4}" type="datetimeFigureOut">
               <a:rPr lang="en-US" smtClean="0"/>
-              <a:t>2/27/2019</a:t>
+              <a:t>3/2/2019</a:t>
             </a:fld>
             <a:endParaRPr lang="en-US"/>
           </a:p>
@@ -453,7 +453,7 @@
           <a:p>
             <a:fld id="{E153FC24-88DC-4CE4-A3C2-9F31CD4F9CE4}" type="datetimeFigureOut">
               <a:rPr lang="en-US" smtClean="0"/>
-              <a:t>2/27/2019</a:t>
+              <a:t>3/2/2019</a:t>
             </a:fld>
             <a:endParaRPr lang="en-US"/>
           </a:p>
@@ -633,7 +633,7 @@
           <a:p>
             <a:fld id="{E153FC24-88DC-4CE4-A3C2-9F31CD4F9CE4}" type="datetimeFigureOut">
               <a:rPr lang="en-US" smtClean="0"/>
-              <a:t>2/27/2019</a:t>
+              <a:t>3/2/2019</a:t>
             </a:fld>
             <a:endParaRPr lang="en-US"/>
           </a:p>
@@ -803,7 +803,7 @@
           <a:p>
             <a:fld id="{E153FC24-88DC-4CE4-A3C2-9F31CD4F9CE4}" type="datetimeFigureOut">
               <a:rPr lang="en-US" smtClean="0"/>
-              <a:t>2/27/2019</a:t>
+              <a:t>3/2/2019</a:t>
             </a:fld>
             <a:endParaRPr lang="en-US"/>
           </a:p>
@@ -1047,7 +1047,7 @@
           <a:p>
             <a:fld id="{E153FC24-88DC-4CE4-A3C2-9F31CD4F9CE4}" type="datetimeFigureOut">
               <a:rPr lang="en-US" smtClean="0"/>
-              <a:t>2/27/2019</a:t>
+              <a:t>3/2/2019</a:t>
             </a:fld>
             <a:endParaRPr lang="en-US"/>
           </a:p>
@@ -1279,7 +1279,7 @@
           <a:p>
             <a:fld id="{E153FC24-88DC-4CE4-A3C2-9F31CD4F9CE4}" type="datetimeFigureOut">
               <a:rPr lang="en-US" smtClean="0"/>
-              <a:t>2/27/2019</a:t>
+              <a:t>3/2/2019</a:t>
             </a:fld>
             <a:endParaRPr lang="en-US"/>
           </a:p>
@@ -1646,7 +1646,7 @@
           <a:p>
             <a:fld id="{E153FC24-88DC-4CE4-A3C2-9F31CD4F9CE4}" type="datetimeFigureOut">
               <a:rPr lang="en-US" smtClean="0"/>
-              <a:t>2/27/2019</a:t>
+              <a:t>3/2/2019</a:t>
             </a:fld>
             <a:endParaRPr lang="en-US"/>
           </a:p>
@@ -1764,7 +1764,7 @@
           <a:p>
             <a:fld id="{E153FC24-88DC-4CE4-A3C2-9F31CD4F9CE4}" type="datetimeFigureOut">
               <a:rPr lang="en-US" smtClean="0"/>
-              <a:t>2/27/2019</a:t>
+              <a:t>3/2/2019</a:t>
             </a:fld>
             <a:endParaRPr lang="en-US"/>
           </a:p>
@@ -1859,7 +1859,7 @@
           <a:p>
             <a:fld id="{E153FC24-88DC-4CE4-A3C2-9F31CD4F9CE4}" type="datetimeFigureOut">
               <a:rPr lang="en-US" smtClean="0"/>
-              <a:t>2/27/2019</a:t>
+              <a:t>3/2/2019</a:t>
             </a:fld>
             <a:endParaRPr lang="en-US"/>
           </a:p>
@@ -2136,7 +2136,7 @@
           <a:p>
             <a:fld id="{E153FC24-88DC-4CE4-A3C2-9F31CD4F9CE4}" type="datetimeFigureOut">
               <a:rPr lang="en-US" smtClean="0"/>
-              <a:t>2/27/2019</a:t>
+              <a:t>3/2/2019</a:t>
             </a:fld>
             <a:endParaRPr lang="en-US"/>
           </a:p>
@@ -2393,7 +2393,7 @@
           <a:p>
             <a:fld id="{E153FC24-88DC-4CE4-A3C2-9F31CD4F9CE4}" type="datetimeFigureOut">
               <a:rPr lang="en-US" smtClean="0"/>
-              <a:t>2/27/2019</a:t>
+              <a:t>3/2/2019</a:t>
             </a:fld>
             <a:endParaRPr lang="en-US"/>
           </a:p>
@@ -2606,7 +2606,7 @@
           <a:p>
             <a:fld id="{E153FC24-88DC-4CE4-A3C2-9F31CD4F9CE4}" type="datetimeFigureOut">
               <a:rPr lang="en-US" smtClean="0"/>
-              <a:t>2/27/2019</a:t>
+              <a:t>3/2/2019</a:t>
             </a:fld>
             <a:endParaRPr lang="en-US"/>
           </a:p>
@@ -3454,7 +3454,7 @@
         </p:nvSpPr>
         <p:spPr>
           <a:xfrm>
-            <a:off x="907026" y="12210113"/>
+            <a:off x="907026" y="12357598"/>
             <a:ext cx="14608468" cy="584775"/>
           </a:xfrm>
           <a:prstGeom prst="rect">
@@ -3499,7 +3499,7 @@
         </p:nvSpPr>
         <p:spPr>
           <a:xfrm>
-            <a:off x="921774" y="13065859"/>
+            <a:off x="921774" y="13213344"/>
             <a:ext cx="10054713" cy="6555641"/>
           </a:xfrm>
           <a:prstGeom prst="rect">
@@ -3599,7 +3599,7 @@
         </p:nvSpPr>
         <p:spPr>
           <a:xfrm>
-            <a:off x="34699575" y="3657600"/>
+            <a:off x="34752979" y="16325731"/>
             <a:ext cx="8277225" cy="584775"/>
           </a:xfrm>
           <a:prstGeom prst="rect">
@@ -3644,8 +3644,8 @@
         </p:nvSpPr>
         <p:spPr>
           <a:xfrm>
-            <a:off x="34695888" y="4457700"/>
-            <a:ext cx="8277225" cy="4401205"/>
+            <a:off x="34749292" y="17125831"/>
+            <a:ext cx="8277225" cy="1815882"/>
           </a:xfrm>
           <a:prstGeom prst="rect">
             <a:avLst/>
@@ -3681,17 +3681,14 @@
             </a:endParaRPr>
           </a:p>
           <a:p>
-            <a:r>
-              <a:rPr lang="en-US" sz="2800" dirty="0">
-                <a:solidFill>
-                  <a:schemeClr val="bg1"/>
-                </a:solidFill>
-                <a:latin typeface="Open Sans" panose="020B0606030504020204" pitchFamily="34" charset="0"/>
-                <a:ea typeface="Open Sans" panose="020B0606030504020204" pitchFamily="34" charset="0"/>
-                <a:cs typeface="Open Sans" panose="020B0606030504020204" pitchFamily="34" charset="0"/>
-              </a:rPr>
-              <a:t>One recommendation that we do have at this time is that these models don’t perform well on classifying contamination signals that have not been seen before. We suggest that more data is provided to fully enumerate the possible contamination classes that would exist near the test site.</a:t>
-            </a:r>
+            <a:endParaRPr lang="en-US" sz="2800" dirty="0">
+              <a:solidFill>
+                <a:schemeClr val="bg1"/>
+              </a:solidFill>
+              <a:latin typeface="Open Sans" panose="020B0606030504020204" pitchFamily="34" charset="0"/>
+              <a:ea typeface="Open Sans" panose="020B0606030504020204" pitchFamily="34" charset="0"/>
+              <a:cs typeface="Open Sans" panose="020B0606030504020204" pitchFamily="34" charset="0"/>
+            </a:endParaRPr>
           </a:p>
         </p:txBody>
       </p:sp>
@@ -3709,7 +3706,7 @@
         </p:nvSpPr>
         <p:spPr>
           <a:xfrm>
-            <a:off x="34706949" y="11604441"/>
+            <a:off x="34709407" y="3650100"/>
             <a:ext cx="8277225" cy="584775"/>
           </a:xfrm>
           <a:prstGeom prst="rect">
@@ -3754,7 +3751,7 @@
         </p:nvSpPr>
         <p:spPr>
           <a:xfrm>
-            <a:off x="34703262" y="12404541"/>
+            <a:off x="34709407" y="4457700"/>
             <a:ext cx="8277225" cy="6124754"/>
           </a:xfrm>
           <a:prstGeom prst="rect">
@@ -3845,7 +3842,7 @@
         </p:nvSpPr>
         <p:spPr>
           <a:xfrm>
-            <a:off x="34706949" y="19731292"/>
+            <a:off x="34713094" y="11080463"/>
             <a:ext cx="8277225" cy="584775"/>
           </a:xfrm>
           <a:prstGeom prst="rect">
@@ -3890,8 +3887,8 @@
         </p:nvSpPr>
         <p:spPr>
           <a:xfrm>
-            <a:off x="34703262" y="20531392"/>
-            <a:ext cx="8277225" cy="1384995"/>
+            <a:off x="34709407" y="11880563"/>
+            <a:ext cx="8277225" cy="3970318"/>
           </a:xfrm>
           <a:prstGeom prst="rect">
             <a:avLst/>
@@ -3913,7 +3910,30 @@
                 <a:ea typeface="Open Sans" panose="020B0606030504020204" pitchFamily="34" charset="0"/>
                 <a:cs typeface="Open Sans" panose="020B0606030504020204" pitchFamily="34" charset="0"/>
               </a:rPr>
-              <a:t>Due to the small size of potential contamination audio, the models might not be accurate when classifying new sources of contamination.</a:t>
+              <a:t>Due to the small size of potential contamination audio, the models are not as accurate when classifying new sources of contamination.</a:t>
+            </a:r>
+          </a:p>
+          <a:p>
+            <a:endParaRPr lang="en-US" sz="2800" dirty="0">
+              <a:solidFill>
+                <a:schemeClr val="bg1"/>
+              </a:solidFill>
+              <a:latin typeface="Open Sans" panose="020B0606030504020204" pitchFamily="34" charset="0"/>
+              <a:ea typeface="Open Sans" panose="020B0606030504020204" pitchFamily="34" charset="0"/>
+              <a:cs typeface="Open Sans" panose="020B0606030504020204" pitchFamily="34" charset="0"/>
+            </a:endParaRPr>
+          </a:p>
+          <a:p>
+            <a:r>
+              <a:rPr lang="en-US" sz="2800" dirty="0">
+                <a:solidFill>
+                  <a:schemeClr val="bg1"/>
+                </a:solidFill>
+                <a:latin typeface="Open Sans" panose="020B0606030504020204" pitchFamily="34" charset="0"/>
+                <a:ea typeface="Open Sans" panose="020B0606030504020204" pitchFamily="34" charset="0"/>
+                <a:cs typeface="Open Sans" panose="020B0606030504020204" pitchFamily="34" charset="0"/>
+              </a:rPr>
+              <a:t>One recommendation that we do have at this time is that we suggest that more data is provided to fully enumerate the possible contamination classes that would exist near the test site.</a:t>
             </a:r>
           </a:p>
         </p:txBody>
@@ -3932,7 +3952,7 @@
         </p:nvSpPr>
         <p:spPr>
           <a:xfrm>
-            <a:off x="872112" y="20540230"/>
+            <a:off x="872112" y="20687715"/>
             <a:ext cx="14643381" cy="584775"/>
           </a:xfrm>
           <a:prstGeom prst="rect">
@@ -3977,8 +3997,8 @@
         </p:nvSpPr>
         <p:spPr>
           <a:xfrm>
-            <a:off x="872111" y="21579423"/>
-            <a:ext cx="14643381" cy="8710077"/>
+            <a:off x="872111" y="21726908"/>
+            <a:ext cx="14643381" cy="10002738"/>
           </a:xfrm>
           <a:prstGeom prst="rect">
             <a:avLst/>
@@ -4045,6 +4065,29 @@
                 <a:cs typeface="Open Sans" panose="020B0606030504020204" pitchFamily="34" charset="0"/>
               </a:rPr>
               <a:t>To get a general idea of how different feature sets and models perform on this classification task, our initial broad investigation’s goal was to enumerate as many feature set, model pairings as possible while limiting the block size and holding the signal-to-noise ratio constant.</a:t>
+            </a:r>
+          </a:p>
+          <a:p>
+            <a:endParaRPr lang="en-US" sz="2800" dirty="0">
+              <a:solidFill>
+                <a:schemeClr val="bg1"/>
+              </a:solidFill>
+              <a:latin typeface="Open Sans" panose="020B0606030504020204" pitchFamily="34" charset="0"/>
+              <a:ea typeface="Open Sans" panose="020B0606030504020204" pitchFamily="34" charset="0"/>
+              <a:cs typeface="Open Sans" panose="020B0606030504020204" pitchFamily="34" charset="0"/>
+            </a:endParaRPr>
+          </a:p>
+          <a:p>
+            <a:r>
+              <a:rPr lang="en-US" sz="2800" dirty="0">
+                <a:solidFill>
+                  <a:schemeClr val="bg1"/>
+                </a:solidFill>
+                <a:latin typeface="Open Sans" panose="020B0606030504020204" pitchFamily="34" charset="0"/>
+                <a:ea typeface="Open Sans" panose="020B0606030504020204" pitchFamily="34" charset="0"/>
+                <a:cs typeface="Open Sans" panose="020B0606030504020204" pitchFamily="34" charset="0"/>
+              </a:rPr>
+              <a:t>For this investigation, models were trained with their default hyperparameters and settings.</a:t>
             </a:r>
           </a:p>
           <a:p>
@@ -4198,7 +4241,7 @@
         </p:nvSpPr>
         <p:spPr>
           <a:xfrm>
-            <a:off x="15943033" y="3657599"/>
+            <a:off x="16170004" y="3657599"/>
             <a:ext cx="17889767" cy="584775"/>
           </a:xfrm>
           <a:prstGeom prst="rect">
@@ -4243,7 +4286,7 @@
         </p:nvSpPr>
         <p:spPr>
           <a:xfrm>
-            <a:off x="15943033" y="12210113"/>
+            <a:off x="16170004" y="12357598"/>
             <a:ext cx="17889767" cy="584775"/>
           </a:xfrm>
           <a:prstGeom prst="rect">
@@ -4288,7 +4331,7 @@
         </p:nvSpPr>
         <p:spPr>
           <a:xfrm>
-            <a:off x="34701979" y="27914025"/>
+            <a:off x="34741864" y="29166924"/>
             <a:ext cx="8277225" cy="584775"/>
           </a:xfrm>
           <a:prstGeom prst="rect">
@@ -4333,7 +4376,7 @@
         </p:nvSpPr>
         <p:spPr>
           <a:xfrm>
-            <a:off x="34709407" y="28660865"/>
+            <a:off x="34749292" y="29913764"/>
             <a:ext cx="8277225" cy="1815882"/>
           </a:xfrm>
           <a:prstGeom prst="rect">
@@ -4405,36 +4448,6 @@
           </a:p>
         </p:txBody>
       </p:sp>
-      <p:pic>
-        <p:nvPicPr>
-          <p:cNvPr id="3" name="Picture 2">
-            <a:extLst>
-              <a:ext uri="{FF2B5EF4-FFF2-40B4-BE49-F238E27FC236}">
-                <a16:creationId xmlns:a16="http://schemas.microsoft.com/office/drawing/2014/main" id="{E599E949-992F-4470-8C43-187115705850}"/>
-              </a:ext>
-            </a:extLst>
-          </p:cNvPr>
-          <p:cNvPicPr>
-            <a:picLocks noChangeAspect="1"/>
-          </p:cNvPicPr>
-          <p:nvPr/>
-        </p:nvPicPr>
-        <p:blipFill>
-          <a:blip r:embed="rId3"/>
-          <a:stretch>
-            <a:fillRect/>
-          </a:stretch>
-        </p:blipFill>
-        <p:spPr>
-          <a:xfrm>
-            <a:off x="9692739" y="4975563"/>
-            <a:ext cx="5432961" cy="5693865"/>
-          </a:xfrm>
-          <a:prstGeom prst="rect">
-            <a:avLst/>
-          </a:prstGeom>
-        </p:spPr>
-      </p:pic>
       <p:sp>
         <p:nvSpPr>
           <p:cNvPr id="26" name="Rectangle 25">
@@ -4449,8 +4462,8 @@
         </p:nvSpPr>
         <p:spPr>
           <a:xfrm>
-            <a:off x="11226018" y="13185343"/>
-            <a:ext cx="3899682" cy="2944626"/>
+            <a:off x="9753599" y="4829082"/>
+            <a:ext cx="5577841" cy="5812876"/>
           </a:xfrm>
           <a:prstGeom prst="rect">
             <a:avLst/>
@@ -4481,6 +4494,36 @@
           </a:p>
         </p:txBody>
       </p:sp>
+      <p:pic>
+        <p:nvPicPr>
+          <p:cNvPr id="3" name="Picture 2">
+            <a:extLst>
+              <a:ext uri="{FF2B5EF4-FFF2-40B4-BE49-F238E27FC236}">
+                <a16:creationId xmlns:a16="http://schemas.microsoft.com/office/drawing/2014/main" id="{E599E949-992F-4470-8C43-187115705850}"/>
+              </a:ext>
+            </a:extLst>
+          </p:cNvPr>
+          <p:cNvPicPr>
+            <a:picLocks noChangeAspect="1"/>
+          </p:cNvPicPr>
+          <p:nvPr/>
+        </p:nvPicPr>
+        <p:blipFill>
+          <a:blip r:embed="rId3"/>
+          <a:stretch>
+            <a:fillRect/>
+          </a:stretch>
+        </p:blipFill>
+        <p:spPr>
+          <a:xfrm>
+            <a:off x="9831429" y="4888587"/>
+            <a:ext cx="5432961" cy="5693865"/>
+          </a:xfrm>
+          <a:prstGeom prst="rect">
+            <a:avLst/>
+          </a:prstGeom>
+        </p:spPr>
+      </p:pic>
       <p:sp>
         <p:nvSpPr>
           <p:cNvPr id="28" name="Rectangle 27">
@@ -4495,8 +4538,8 @@
         </p:nvSpPr>
         <p:spPr>
           <a:xfrm>
-            <a:off x="11226018" y="16580584"/>
-            <a:ext cx="3899682" cy="2944625"/>
+            <a:off x="11163300" y="13244360"/>
+            <a:ext cx="4019550" cy="3060700"/>
           </a:xfrm>
           <a:prstGeom prst="rect">
             <a:avLst/>
@@ -4542,14 +4585,14 @@
           <p:nvPr>
             <p:extLst>
               <p:ext uri="{D42A27DB-BD31-4B8C-83A1-F6EECF244321}">
-                <p14:modId xmlns:p14="http://schemas.microsoft.com/office/powerpoint/2010/main" val="1565540252"/>
+                <p14:modId xmlns:p14="http://schemas.microsoft.com/office/powerpoint/2010/main" val="3609564310"/>
               </p:ext>
             </p:extLst>
           </p:nvPr>
         </p:nvGraphicFramePr>
         <p:xfrm>
-          <a:off x="15974287" y="4975563"/>
-          <a:ext cx="12344826" cy="6555643"/>
+          <a:off x="16201258" y="4829083"/>
+          <a:ext cx="12280672" cy="6775361"/>
         </p:xfrm>
         <a:graphic>
           <a:graphicData uri="http://schemas.openxmlformats.org/drawingml/2006/table">
@@ -4558,126 +4601,126 @@
                 <a:tableStyleId>{5C22544A-7EE6-4342-B048-85BDC9FD1C3A}</a:tableStyleId>
               </a:tblPr>
               <a:tblGrid>
-                <a:gridCol w="2311579">
+                <a:gridCol w="2299564">
                   <a:extLst>
                     <a:ext uri="{9D8B030D-6E8A-4147-A177-3AD203B41FA5}">
                       <a16:colId xmlns:a16="http://schemas.microsoft.com/office/drawing/2014/main" val="1151871436"/>
                     </a:ext>
                   </a:extLst>
                 </a:gridCol>
-                <a:gridCol w="590191">
+                <a:gridCol w="587124">
                   <a:extLst>
                     <a:ext uri="{9D8B030D-6E8A-4147-A177-3AD203B41FA5}">
                       <a16:colId xmlns:a16="http://schemas.microsoft.com/office/drawing/2014/main" val="2393237374"/>
                     </a:ext>
                   </a:extLst>
                 </a:gridCol>
-                <a:gridCol w="590191">
+                <a:gridCol w="598600">
                   <a:extLst>
                     <a:ext uri="{9D8B030D-6E8A-4147-A177-3AD203B41FA5}">
                       <a16:colId xmlns:a16="http://schemas.microsoft.com/office/drawing/2014/main" val="335090396"/>
                     </a:ext>
                   </a:extLst>
                 </a:gridCol>
-                <a:gridCol w="590191">
+                <a:gridCol w="575648">
                   <a:extLst>
                     <a:ext uri="{9D8B030D-6E8A-4147-A177-3AD203B41FA5}">
                       <a16:colId xmlns:a16="http://schemas.microsoft.com/office/drawing/2014/main" val="3717863262"/>
                     </a:ext>
                   </a:extLst>
                 </a:gridCol>
-                <a:gridCol w="590191">
+                <a:gridCol w="587124">
                   <a:extLst>
                     <a:ext uri="{9D8B030D-6E8A-4147-A177-3AD203B41FA5}">
                       <a16:colId xmlns:a16="http://schemas.microsoft.com/office/drawing/2014/main" val="2897946089"/>
                     </a:ext>
                   </a:extLst>
                 </a:gridCol>
-                <a:gridCol w="590191">
+                <a:gridCol w="587124">
                   <a:extLst>
                     <a:ext uri="{9D8B030D-6E8A-4147-A177-3AD203B41FA5}">
                       <a16:colId xmlns:a16="http://schemas.microsoft.com/office/drawing/2014/main" val="2621680780"/>
                     </a:ext>
                   </a:extLst>
                 </a:gridCol>
-                <a:gridCol w="590191">
+                <a:gridCol w="587124">
                   <a:extLst>
                     <a:ext uri="{9D8B030D-6E8A-4147-A177-3AD203B41FA5}">
                       <a16:colId xmlns:a16="http://schemas.microsoft.com/office/drawing/2014/main" val="530238323"/>
                     </a:ext>
                   </a:extLst>
                 </a:gridCol>
-                <a:gridCol w="590191">
+                <a:gridCol w="587124">
                   <a:extLst>
                     <a:ext uri="{9D8B030D-6E8A-4147-A177-3AD203B41FA5}">
                       <a16:colId xmlns:a16="http://schemas.microsoft.com/office/drawing/2014/main" val="3264923264"/>
                     </a:ext>
                   </a:extLst>
                 </a:gridCol>
-                <a:gridCol w="590191">
+                <a:gridCol w="587124">
                   <a:extLst>
                     <a:ext uri="{9D8B030D-6E8A-4147-A177-3AD203B41FA5}">
                       <a16:colId xmlns:a16="http://schemas.microsoft.com/office/drawing/2014/main" val="3377233041"/>
                     </a:ext>
                   </a:extLst>
                 </a:gridCol>
-                <a:gridCol w="590191">
+                <a:gridCol w="587124">
                   <a:extLst>
                     <a:ext uri="{9D8B030D-6E8A-4147-A177-3AD203B41FA5}">
                       <a16:colId xmlns:a16="http://schemas.microsoft.com/office/drawing/2014/main" val="514851023"/>
                     </a:ext>
                   </a:extLst>
                 </a:gridCol>
-                <a:gridCol w="590191">
+                <a:gridCol w="587124">
                   <a:extLst>
                     <a:ext uri="{9D8B030D-6E8A-4147-A177-3AD203B41FA5}">
                       <a16:colId xmlns:a16="http://schemas.microsoft.com/office/drawing/2014/main" val="829764803"/>
                     </a:ext>
                   </a:extLst>
                 </a:gridCol>
-                <a:gridCol w="590191">
+                <a:gridCol w="587124">
                   <a:extLst>
                     <a:ext uri="{9D8B030D-6E8A-4147-A177-3AD203B41FA5}">
                       <a16:colId xmlns:a16="http://schemas.microsoft.com/office/drawing/2014/main" val="1008829834"/>
                     </a:ext>
                   </a:extLst>
                 </a:gridCol>
-                <a:gridCol w="590191">
+                <a:gridCol w="587124">
                   <a:extLst>
                     <a:ext uri="{9D8B030D-6E8A-4147-A177-3AD203B41FA5}">
                       <a16:colId xmlns:a16="http://schemas.microsoft.com/office/drawing/2014/main" val="950132651"/>
                     </a:ext>
                   </a:extLst>
                 </a:gridCol>
-                <a:gridCol w="590191">
+                <a:gridCol w="587124">
                   <a:extLst>
                     <a:ext uri="{9D8B030D-6E8A-4147-A177-3AD203B41FA5}">
                       <a16:colId xmlns:a16="http://schemas.microsoft.com/office/drawing/2014/main" val="45596056"/>
                     </a:ext>
                   </a:extLst>
                 </a:gridCol>
-                <a:gridCol w="590191">
+                <a:gridCol w="587124">
                   <a:extLst>
                     <a:ext uri="{9D8B030D-6E8A-4147-A177-3AD203B41FA5}">
                       <a16:colId xmlns:a16="http://schemas.microsoft.com/office/drawing/2014/main" val="2795060661"/>
                     </a:ext>
                   </a:extLst>
                 </a:gridCol>
-                <a:gridCol w="590191">
+                <a:gridCol w="587124">
                   <a:extLst>
                     <a:ext uri="{9D8B030D-6E8A-4147-A177-3AD203B41FA5}">
                       <a16:colId xmlns:a16="http://schemas.microsoft.com/office/drawing/2014/main" val="558077079"/>
                     </a:ext>
                   </a:extLst>
                 </a:gridCol>
-                <a:gridCol w="590191">
+                <a:gridCol w="587124">
                   <a:extLst>
                     <a:ext uri="{9D8B030D-6E8A-4147-A177-3AD203B41FA5}">
                       <a16:colId xmlns:a16="http://schemas.microsoft.com/office/drawing/2014/main" val="261827523"/>
                     </a:ext>
                   </a:extLst>
                 </a:gridCol>
-                <a:gridCol w="590191">
+                <a:gridCol w="587124">
                   <a:extLst>
                     <a:ext uri="{9D8B030D-6E8A-4147-A177-3AD203B41FA5}">
                       <a16:colId xmlns:a16="http://schemas.microsoft.com/office/drawing/2014/main" val="805535808"/>
@@ -4685,7 +4728,7 @@
                   </a:extLst>
                 </a:gridCol>
               </a:tblGrid>
-              <a:tr h="830217">
+              <a:tr h="743626">
                 <a:tc>
                   <a:txBody>
                     <a:bodyPr/>
@@ -4731,14 +4774,14 @@
                     <a:p>
                       <a:pPr algn="ctr" fontAlgn="b"/>
                       <a:r>
-                        <a:rPr lang="en-US" sz="1100" b="1" i="0" u="none" strike="noStrike" dirty="0">
+                        <a:rPr lang="en-US" sz="1000" b="1" i="0" u="none" strike="noStrike" dirty="0">
                           <a:solidFill>
                             <a:schemeClr val="tx1"/>
                           </a:solidFill>
                           <a:effectLst/>
                           <a:latin typeface="Calibri" panose="020F0502020204030204" pitchFamily="34" charset="0"/>
                         </a:rPr>
-                        <a:t>Block length (s)</a:t>
+                        <a:t>Block Length (s)</a:t>
                       </a:r>
                     </a:p>
                   </a:txBody>
@@ -4761,12 +4804,12 @@
                     <a:p>
                       <a:pPr algn="ctr" fontAlgn="b"/>
                       <a:r>
-                        <a:rPr lang="en-US" sz="1100" b="1" u="none" strike="noStrike" dirty="0">
-                          <a:effectLst/>
-                        </a:rPr>
-                        <a:t>Logistic regression</a:t>
-                      </a:r>
-                      <a:endParaRPr lang="en-US" sz="1100" b="1" i="0" u="none" strike="noStrike" dirty="0">
+                        <a:rPr lang="en-US" sz="1000" b="1" u="none" strike="noStrike" dirty="0">
+                          <a:effectLst/>
+                        </a:rPr>
+                        <a:t>Logistic Regression</a:t>
+                      </a:r>
+                      <a:endParaRPr lang="en-US" sz="1000" b="1" i="0" u="none" strike="noStrike" dirty="0">
                         <a:solidFill>
                           <a:srgbClr val="44546A"/>
                         </a:solidFill>
@@ -4794,12 +4837,12 @@
                     <a:p>
                       <a:pPr algn="ctr" fontAlgn="b"/>
                       <a:r>
-                        <a:rPr lang="en-US" sz="1100" b="1" u="none" strike="noStrike" dirty="0">
-                          <a:effectLst/>
-                        </a:rPr>
-                        <a:t>Fine tree</a:t>
-                      </a:r>
-                      <a:endParaRPr lang="en-US" sz="1100" b="1" i="0" u="none" strike="noStrike" dirty="0">
+                        <a:rPr lang="en-US" sz="1000" b="1" u="none" strike="noStrike" dirty="0">
+                          <a:effectLst/>
+                        </a:rPr>
+                        <a:t>Fine Tree</a:t>
+                      </a:r>
+                      <a:endParaRPr lang="en-US" sz="1000" b="1" i="0" u="none" strike="noStrike" dirty="0">
                         <a:solidFill>
                           <a:srgbClr val="44546A"/>
                         </a:solidFill>
@@ -4827,12 +4870,12 @@
                     <a:p>
                       <a:pPr algn="ctr" fontAlgn="b"/>
                       <a:r>
-                        <a:rPr lang="en-US" sz="1100" b="1" u="none" strike="noStrike">
-                          <a:effectLst/>
-                        </a:rPr>
-                        <a:t>Medium tree</a:t>
-                      </a:r>
-                      <a:endParaRPr lang="en-US" sz="1100" b="1" i="0" u="none" strike="noStrike">
+                        <a:rPr lang="en-US" sz="1000" b="1" u="none" strike="noStrike" dirty="0">
+                          <a:effectLst/>
+                        </a:rPr>
+                        <a:t>Medium Tree</a:t>
+                      </a:r>
+                      <a:endParaRPr lang="en-US" sz="1000" b="1" i="0" u="none" strike="noStrike" dirty="0">
                         <a:solidFill>
                           <a:srgbClr val="44546A"/>
                         </a:solidFill>
@@ -4860,12 +4903,12 @@
                     <a:p>
                       <a:pPr algn="ctr" fontAlgn="b"/>
                       <a:r>
-                        <a:rPr lang="en-US" sz="1100" b="1" u="none" strike="noStrike">
-                          <a:effectLst/>
-                        </a:rPr>
-                        <a:t>Coarse tree</a:t>
-                      </a:r>
-                      <a:endParaRPr lang="en-US" sz="1100" b="1" i="0" u="none" strike="noStrike">
+                        <a:rPr lang="en-US" sz="1000" b="1" u="none" strike="noStrike" dirty="0">
+                          <a:effectLst/>
+                        </a:rPr>
+                        <a:t>Coarse Tree</a:t>
+                      </a:r>
+                      <a:endParaRPr lang="en-US" sz="1000" b="1" i="0" u="none" strike="noStrike" dirty="0">
                         <a:solidFill>
                           <a:srgbClr val="44546A"/>
                         </a:solidFill>
@@ -4893,12 +4936,12 @@
                     <a:p>
                       <a:pPr algn="ctr" fontAlgn="b"/>
                       <a:r>
-                        <a:rPr lang="en-US" sz="1100" b="1" u="none" strike="noStrike">
-                          <a:effectLst/>
-                        </a:rPr>
-                        <a:t>Boosted trees ensemble</a:t>
-                      </a:r>
-                      <a:endParaRPr lang="en-US" sz="1100" b="1" i="0" u="none" strike="noStrike">
+                        <a:rPr lang="en-US" sz="1000" b="1" u="none" strike="noStrike" dirty="0">
+                          <a:effectLst/>
+                        </a:rPr>
+                        <a:t>Boosted Trees Ensemble</a:t>
+                      </a:r>
+                      <a:endParaRPr lang="en-US" sz="1000" b="1" i="0" u="none" strike="noStrike" dirty="0">
                         <a:solidFill>
                           <a:srgbClr val="44546A"/>
                         </a:solidFill>
@@ -4926,12 +4969,12 @@
                     <a:p>
                       <a:pPr algn="ctr" fontAlgn="b"/>
                       <a:r>
-                        <a:rPr lang="en-US" sz="1100" b="1" u="none" strike="noStrike">
-                          <a:effectLst/>
-                        </a:rPr>
-                        <a:t>Bagged trees ensemble</a:t>
-                      </a:r>
-                      <a:endParaRPr lang="en-US" sz="1100" b="1" i="0" u="none" strike="noStrike">
+                        <a:rPr lang="en-US" sz="1000" b="1" u="none" strike="noStrike" dirty="0">
+                          <a:effectLst/>
+                        </a:rPr>
+                        <a:t>Bagged Trees Ensemble</a:t>
+                      </a:r>
+                      <a:endParaRPr lang="en-US" sz="1000" b="1" i="0" u="none" strike="noStrike" dirty="0">
                         <a:solidFill>
                           <a:srgbClr val="44546A"/>
                         </a:solidFill>
@@ -4959,12 +5002,12 @@
                     <a:p>
                       <a:pPr algn="ctr" fontAlgn="b"/>
                       <a:r>
-                        <a:rPr lang="en-US" sz="1100" b="1" u="none" strike="noStrike" dirty="0">
+                        <a:rPr lang="en-US" sz="1000" b="1" u="none" strike="noStrike" dirty="0">
                           <a:effectLst/>
                         </a:rPr>
                         <a:t>Linear SVM</a:t>
                       </a:r>
-                      <a:endParaRPr lang="en-US" sz="1100" b="1" i="0" u="none" strike="noStrike" dirty="0">
+                      <a:endParaRPr lang="en-US" sz="1000" b="1" i="0" u="none" strike="noStrike" dirty="0">
                         <a:solidFill>
                           <a:srgbClr val="44546A"/>
                         </a:solidFill>
@@ -4992,12 +5035,12 @@
                     <a:p>
                       <a:pPr algn="ctr" fontAlgn="b"/>
                       <a:r>
-                        <a:rPr lang="en-US" sz="1100" b="1" u="none" strike="noStrike">
+                        <a:rPr lang="en-US" sz="1000" b="1" u="none" strike="noStrike">
                           <a:effectLst/>
                         </a:rPr>
                         <a:t>Quadratic SVM</a:t>
                       </a:r>
-                      <a:endParaRPr lang="en-US" sz="1100" b="1" i="0" u="none" strike="noStrike">
+                      <a:endParaRPr lang="en-US" sz="1000" b="1" i="0" u="none" strike="noStrike">
                         <a:solidFill>
                           <a:srgbClr val="44546A"/>
                         </a:solidFill>
@@ -5025,12 +5068,12 @@
                     <a:p>
                       <a:pPr algn="ctr" fontAlgn="b"/>
                       <a:r>
-                        <a:rPr lang="en-US" sz="1100" b="1" u="none" strike="noStrike">
+                        <a:rPr lang="en-US" sz="1000" b="1" u="none" strike="noStrike">
                           <a:effectLst/>
                         </a:rPr>
                         <a:t>Cubic SVM</a:t>
                       </a:r>
-                      <a:endParaRPr lang="en-US" sz="1100" b="1" i="0" u="none" strike="noStrike">
+                      <a:endParaRPr lang="en-US" sz="1000" b="1" i="0" u="none" strike="noStrike">
                         <a:solidFill>
                           <a:srgbClr val="44546A"/>
                         </a:solidFill>
@@ -5058,12 +5101,12 @@
                     <a:p>
                       <a:pPr algn="ctr" fontAlgn="b"/>
                       <a:r>
-                        <a:rPr lang="en-US" sz="1100" b="1" u="none" strike="noStrike">
+                        <a:rPr lang="en-US" sz="1000" b="1" u="none" strike="noStrike" dirty="0">
                           <a:effectLst/>
                         </a:rPr>
                         <a:t>Fine Gaussian SVM</a:t>
                       </a:r>
-                      <a:endParaRPr lang="en-US" sz="1100" b="1" i="0" u="none" strike="noStrike">
+                      <a:endParaRPr lang="en-US" sz="1000" b="1" i="0" u="none" strike="noStrike" dirty="0">
                         <a:solidFill>
                           <a:srgbClr val="44546A"/>
                         </a:solidFill>
@@ -5091,12 +5134,12 @@
                     <a:p>
                       <a:pPr algn="ctr" fontAlgn="b"/>
                       <a:r>
-                        <a:rPr lang="en-US" sz="1100" b="1" u="none" strike="noStrike" dirty="0">
+                        <a:rPr lang="en-US" sz="1000" b="1" u="none" strike="noStrike" dirty="0">
                           <a:effectLst/>
                         </a:rPr>
                         <a:t>Medium Gaussian SVM</a:t>
                       </a:r>
-                      <a:endParaRPr lang="en-US" sz="1100" b="1" i="0" u="none" strike="noStrike" dirty="0">
+                      <a:endParaRPr lang="en-US" sz="1000" b="1" i="0" u="none" strike="noStrike" dirty="0">
                         <a:solidFill>
                           <a:srgbClr val="44546A"/>
                         </a:solidFill>
@@ -5124,12 +5167,12 @@
                     <a:p>
                       <a:pPr algn="ctr" fontAlgn="b"/>
                       <a:r>
-                        <a:rPr lang="en-US" sz="1100" b="1" u="none" strike="noStrike" dirty="0">
+                        <a:rPr lang="en-US" sz="1000" b="1" u="none" strike="noStrike" dirty="0">
                           <a:effectLst/>
                         </a:rPr>
                         <a:t>Coarse Gaussian SVM </a:t>
                       </a:r>
-                      <a:endParaRPr lang="en-US" sz="1100" b="1" i="0" u="none" strike="noStrike" dirty="0">
+                      <a:endParaRPr lang="en-US" sz="1000" b="1" i="0" u="none" strike="noStrike" dirty="0">
                         <a:solidFill>
                           <a:srgbClr val="44546A"/>
                         </a:solidFill>
@@ -5157,12 +5200,12 @@
                     <a:p>
                       <a:pPr algn="ctr" fontAlgn="b"/>
                       <a:r>
-                        <a:rPr lang="en-US" sz="1100" b="1" u="none" strike="noStrike" dirty="0">
+                        <a:rPr lang="en-US" sz="1000" b="1" u="none" strike="noStrike" dirty="0">
                           <a:effectLst/>
                         </a:rPr>
                         <a:t>Subspace KNN</a:t>
                       </a:r>
-                      <a:endParaRPr lang="en-US" sz="1100" b="1" i="0" u="none" strike="noStrike" dirty="0">
+                      <a:endParaRPr lang="en-US" sz="1000" b="1" i="0" u="none" strike="noStrike" dirty="0">
                         <a:solidFill>
                           <a:srgbClr val="44546A"/>
                         </a:solidFill>
@@ -5190,12 +5233,12 @@
                     <a:p>
                       <a:pPr algn="ctr" fontAlgn="b"/>
                       <a:r>
-                        <a:rPr lang="en-US" sz="1100" b="1" u="none" strike="noStrike">
+                        <a:rPr lang="en-US" sz="1000" b="1" u="none" strike="noStrike">
                           <a:effectLst/>
                         </a:rPr>
                         <a:t>Neural Net</a:t>
                       </a:r>
-                      <a:endParaRPr lang="en-US" sz="1100" b="1" i="0" u="none" strike="noStrike">
+                      <a:endParaRPr lang="en-US" sz="1000" b="1" i="0" u="none" strike="noStrike">
                         <a:solidFill>
                           <a:srgbClr val="44546A"/>
                         </a:solidFill>
@@ -5223,12 +5266,12 @@
                     <a:p>
                       <a:pPr algn="ctr" fontAlgn="b"/>
                       <a:r>
-                        <a:rPr lang="en-US" sz="1100" b="1" u="none" strike="noStrike" dirty="0">
+                        <a:rPr lang="en-US" sz="1000" b="1" u="none" strike="noStrike" dirty="0">
                           <a:effectLst/>
                         </a:rPr>
                         <a:t>CNN</a:t>
                       </a:r>
-                      <a:endParaRPr lang="en-US" sz="1100" b="1" i="0" u="none" strike="noStrike" dirty="0">
+                      <a:endParaRPr lang="en-US" sz="1000" b="1" i="0" u="none" strike="noStrike" dirty="0">
                         <a:solidFill>
                           <a:srgbClr val="44546A"/>
                         </a:solidFill>
@@ -5256,12 +5299,12 @@
                     <a:p>
                       <a:pPr algn="ctr" fontAlgn="b"/>
                       <a:r>
-                        <a:rPr lang="en-US" sz="1100" b="1" u="none" strike="noStrike" dirty="0">
+                        <a:rPr lang="en-US" sz="1000" b="1" u="none" strike="noStrike" dirty="0">
                           <a:effectLst/>
                         </a:rPr>
                         <a:t>LSTM NN</a:t>
                       </a:r>
-                      <a:endParaRPr lang="en-US" sz="1100" b="1" i="0" u="none" strike="noStrike" dirty="0">
+                      <a:endParaRPr lang="en-US" sz="1000" b="1" i="0" u="none" strike="noStrike" dirty="0">
                         <a:solidFill>
                           <a:srgbClr val="44546A"/>
                         </a:solidFill>
@@ -5288,7 +5331,7 @@
                   </a:ext>
                 </a:extLst>
               </a:tr>
-              <a:tr h="204992">
+              <a:tr h="215959">
                 <a:tc>
                   <a:txBody>
                     <a:bodyPr/>
@@ -5903,7 +5946,7 @@
                   </a:ext>
                 </a:extLst>
               </a:tr>
-              <a:tr h="204992">
+              <a:tr h="215959">
                 <a:tc>
                   <a:txBody>
                     <a:bodyPr/>
@@ -6354,7 +6397,7 @@
                   </a:ext>
                 </a:extLst>
               </a:tr>
-              <a:tr h="204992">
+              <a:tr h="215959">
                 <a:tc>
                   <a:txBody>
                     <a:bodyPr/>
@@ -6792,7 +6835,7 @@
                   </a:ext>
                 </a:extLst>
               </a:tr>
-              <a:tr h="204992">
+              <a:tr h="215959">
                 <a:tc>
                   <a:txBody>
                     <a:bodyPr/>
@@ -7270,7 +7313,7 @@
                   </a:ext>
                 </a:extLst>
               </a:tr>
-              <a:tr h="204992">
+              <a:tr h="215959">
                 <a:tc>
                   <a:txBody>
                     <a:bodyPr/>
@@ -7708,7 +7751,7 @@
                   </a:ext>
                 </a:extLst>
               </a:tr>
-              <a:tr h="204992">
+              <a:tr h="215959">
                 <a:tc>
                   <a:txBody>
                     <a:bodyPr/>
@@ -8159,7 +8202,7 @@
                   </a:ext>
                 </a:extLst>
               </a:tr>
-              <a:tr h="204992">
+              <a:tr h="215959">
                 <a:tc>
                   <a:txBody>
                     <a:bodyPr/>
@@ -8597,7 +8640,7 @@
                   </a:ext>
                 </a:extLst>
               </a:tr>
-              <a:tr h="204992">
+              <a:tr h="215959">
                 <a:tc>
                   <a:txBody>
                     <a:bodyPr/>
@@ -9041,7 +9084,7 @@
                   </a:ext>
                 </a:extLst>
               </a:tr>
-              <a:tr h="204992">
+              <a:tr h="215959">
                 <a:tc>
                   <a:txBody>
                     <a:bodyPr/>
@@ -9479,7 +9522,7 @@
                   </a:ext>
                 </a:extLst>
               </a:tr>
-              <a:tr h="204992">
+              <a:tr h="215959">
                 <a:tc>
                   <a:txBody>
                     <a:bodyPr/>
@@ -9923,7 +9966,7 @@
                   </a:ext>
                 </a:extLst>
               </a:tr>
-              <a:tr h="204992">
+              <a:tr h="215959">
                 <a:tc>
                   <a:txBody>
                     <a:bodyPr/>
@@ -10313,7 +10356,7 @@
                   </a:ext>
                 </a:extLst>
               </a:tr>
-              <a:tr h="204992">
+              <a:tr h="215959">
                 <a:tc>
                   <a:txBody>
                     <a:bodyPr/>
@@ -10703,7 +10746,7 @@
                   </a:ext>
                 </a:extLst>
               </a:tr>
-              <a:tr h="204992">
+              <a:tr h="215959">
                 <a:tc>
                   <a:txBody>
                     <a:bodyPr/>
@@ -11018,7 +11061,7 @@
                     <a:lstStyle/>
                     <a:p>
                       <a:pPr algn="ctr" fontAlgn="b"/>
-                      <a:endParaRPr lang="en-US" sz="1100" b="0" i="0" u="none" strike="noStrike">
+                      <a:endParaRPr lang="en-US" sz="1100" b="0" i="0" u="none" strike="noStrike" dirty="0">
                         <a:solidFill>
                           <a:srgbClr val="000000"/>
                         </a:solidFill>
@@ -11082,7 +11125,7 @@
                   </a:ext>
                 </a:extLst>
               </a:tr>
-              <a:tr h="204992">
+              <a:tr h="215959">
                 <a:tc>
                   <a:txBody>
                     <a:bodyPr/>
@@ -11454,7 +11497,7 @@
                   </a:ext>
                 </a:extLst>
               </a:tr>
-              <a:tr h="190642">
+              <a:tr h="200842">
                 <a:tc>
                   <a:txBody>
                     <a:bodyPr/>
@@ -11826,7 +11869,7 @@
                   </a:ext>
                 </a:extLst>
               </a:tr>
-              <a:tr h="204992">
+              <a:tr h="215959">
                 <a:tc>
                   <a:txBody>
                     <a:bodyPr/>
@@ -12264,7 +12307,7 @@
                   </a:ext>
                 </a:extLst>
               </a:tr>
-              <a:tr h="204992">
+              <a:tr h="215959">
                 <a:tc>
                   <a:txBody>
                     <a:bodyPr/>
@@ -12702,7 +12745,7 @@
                   </a:ext>
                 </a:extLst>
               </a:tr>
-              <a:tr h="204992">
+              <a:tr h="215959">
                 <a:tc>
                   <a:txBody>
                     <a:bodyPr/>
@@ -13147,7 +13190,7 @@
                   </a:ext>
                 </a:extLst>
               </a:tr>
-              <a:tr h="204992">
+              <a:tr h="215959">
                 <a:tc>
                   <a:txBody>
                     <a:bodyPr/>
@@ -13617,7 +13660,7 @@
                   </a:ext>
                 </a:extLst>
               </a:tr>
-              <a:tr h="204992">
+              <a:tr h="215959">
                 <a:tc>
                   <a:txBody>
                     <a:bodyPr/>
@@ -14094,7 +14137,7 @@
                   </a:ext>
                 </a:extLst>
               </a:tr>
-              <a:tr h="204992">
+              <a:tr h="215959">
                 <a:tc>
                   <a:txBody>
                     <a:bodyPr/>
@@ -14565,7 +14608,7 @@
                   </a:ext>
                 </a:extLst>
               </a:tr>
-              <a:tr h="204992">
+              <a:tr h="215959">
                 <a:tc>
                   <a:txBody>
                     <a:bodyPr/>
@@ -15042,7 +15085,7 @@
                   </a:ext>
                 </a:extLst>
               </a:tr>
-              <a:tr h="204992">
+              <a:tr h="215959">
                 <a:tc>
                   <a:txBody>
                     <a:bodyPr/>
@@ -15513,7 +15556,7 @@
                   </a:ext>
                 </a:extLst>
               </a:tr>
-              <a:tr h="204992">
+              <a:tr h="215959">
                 <a:tc>
                   <a:txBody>
                     <a:bodyPr/>
@@ -15970,7 +16013,7 @@
                   </a:ext>
                 </a:extLst>
               </a:tr>
-              <a:tr h="204992">
+              <a:tr h="215959">
                 <a:tc>
                   <a:txBody>
                     <a:bodyPr/>
@@ -16421,7 +16464,7 @@
                   </a:ext>
                 </a:extLst>
               </a:tr>
-              <a:tr h="204992">
+              <a:tr h="215959">
                 <a:tc>
                   <a:txBody>
                     <a:bodyPr/>
@@ -16877,7 +16920,7 @@
                   </a:ext>
                 </a:extLst>
               </a:tr>
-              <a:tr h="204992">
+              <a:tr h="215959">
                 <a:tc>
                   <a:txBody>
                     <a:bodyPr/>
@@ -17335,7 +17378,7 @@
                   </a:ext>
                 </a:extLst>
               </a:tr>
-              <a:tr h="204992">
+              <a:tr h="215959">
                 <a:tc>
                   <a:txBody>
                     <a:bodyPr/>
@@ -17804,8 +17847,8 @@
         </p:nvSpPr>
         <p:spPr>
           <a:xfrm>
-            <a:off x="28727401" y="4582803"/>
-            <a:ext cx="4800600" cy="2246769"/>
+            <a:off x="28645942" y="4611832"/>
+            <a:ext cx="5413829" cy="6247864"/>
           </a:xfrm>
           <a:prstGeom prst="rect">
             <a:avLst/>
@@ -17819,7 +17862,7 @@
           <a:lstStyle/>
           <a:p>
             <a:r>
-              <a:rPr lang="en-US" sz="2800" b="1" dirty="0">
+              <a:rPr lang="en-US" sz="2800" dirty="0">
                 <a:solidFill>
                   <a:schemeClr val="bg1"/>
                 </a:solidFill>
@@ -17827,7 +17870,7 @@
                 <a:ea typeface="Open Sans" panose="020B0606030504020204" pitchFamily="34" charset="0"/>
                 <a:cs typeface="Open Sans" panose="020B0606030504020204" pitchFamily="34" charset="0"/>
               </a:rPr>
-              <a:t>Something about the results of our broad investigation goes here.</a:t>
+              <a:t>The three feature set, classifier pairs we selected from this investigation are as follows:</a:t>
             </a:r>
           </a:p>
           <a:p>
@@ -17841,8 +17884,12 @@
             </a:endParaRPr>
           </a:p>
           <a:p>
+            <a:pPr marL="342900" indent="-342900" fontAlgn="base">
+              <a:buFont typeface="+mj-lt"/>
+              <a:buAutoNum type="arabicPeriod"/>
+            </a:pPr>
             <a:r>
-              <a:rPr lang="en-US" sz="2800" dirty="0">
+              <a:rPr lang="en-US" sz="2400" dirty="0">
                 <a:solidFill>
                   <a:schemeClr val="bg1"/>
                 </a:solidFill>
@@ -17850,11 +17897,202 @@
                 <a:ea typeface="Open Sans" panose="020B0606030504020204" pitchFamily="34" charset="0"/>
                 <a:cs typeface="Open Sans" panose="020B0606030504020204" pitchFamily="34" charset="0"/>
               </a:rPr>
-              <a:t>Make this shit sound smart</a:t>
+              <a:t>Wavelets (Coiflet2, 5 level, T=2s) - Bagged Trees</a:t>
+            </a:r>
+          </a:p>
+          <a:p>
+            <a:pPr marL="800100" lvl="1" indent="-342900" fontAlgn="base">
+              <a:buFont typeface="Arial" panose="020B0604020202020204" pitchFamily="34" charset="0"/>
+              <a:buChar char="•"/>
+            </a:pPr>
+            <a:r>
+              <a:rPr lang="en-US" sz="2400" dirty="0">
+                <a:solidFill>
+                  <a:schemeClr val="bg1"/>
+                </a:solidFill>
+                <a:latin typeface="Open Sans" panose="020B0606030504020204" pitchFamily="34" charset="0"/>
+                <a:ea typeface="Open Sans" panose="020B0606030504020204" pitchFamily="34" charset="0"/>
+                <a:cs typeface="Open Sans" panose="020B0606030504020204" pitchFamily="34" charset="0"/>
+              </a:rPr>
+              <a:t>Best overall with accuracy of 94.2%</a:t>
+            </a:r>
+          </a:p>
+          <a:p>
+            <a:pPr marL="342900" indent="-342900" fontAlgn="base">
+              <a:buFont typeface="+mj-lt"/>
+              <a:buAutoNum type="arabicPeriod"/>
+            </a:pPr>
+            <a:r>
+              <a:rPr lang="en-US" sz="2400" dirty="0">
+                <a:solidFill>
+                  <a:schemeClr val="bg1"/>
+                </a:solidFill>
+                <a:latin typeface="Open Sans" panose="020B0606030504020204" pitchFamily="34" charset="0"/>
+                <a:ea typeface="Open Sans" panose="020B0606030504020204" pitchFamily="34" charset="0"/>
+                <a:cs typeface="Open Sans" panose="020B0606030504020204" pitchFamily="34" charset="0"/>
+              </a:rPr>
+              <a:t>Wavelets (Coiflet2, 4 level, T=2s) - Bagged Trees</a:t>
+            </a:r>
+          </a:p>
+          <a:p>
+            <a:pPr marL="914400" lvl="1" indent="-457200" fontAlgn="base">
+              <a:buFont typeface="Arial" panose="020B0604020202020204" pitchFamily="34" charset="0"/>
+              <a:buChar char="•"/>
+            </a:pPr>
+            <a:r>
+              <a:rPr lang="en-US" sz="2400" dirty="0">
+                <a:solidFill>
+                  <a:schemeClr val="bg1"/>
+                </a:solidFill>
+                <a:latin typeface="Open Sans" panose="020B0606030504020204" pitchFamily="34" charset="0"/>
+                <a:ea typeface="Open Sans" panose="020B0606030504020204" pitchFamily="34" charset="0"/>
+                <a:cs typeface="Open Sans" panose="020B0606030504020204" pitchFamily="34" charset="0"/>
+              </a:rPr>
+              <a:t>Accuracy of 93.3% </a:t>
+            </a:r>
+          </a:p>
+          <a:p>
+            <a:pPr marL="514350" indent="-514350" fontAlgn="base">
+              <a:buFont typeface="+mj-lt"/>
+              <a:buAutoNum type="arabicPeriod"/>
+            </a:pPr>
+            <a:r>
+              <a:rPr lang="en-US" sz="2400" dirty="0">
+                <a:solidFill>
+                  <a:schemeClr val="bg1"/>
+                </a:solidFill>
+                <a:latin typeface="Open Sans" panose="020B0606030504020204" pitchFamily="34" charset="0"/>
+                <a:ea typeface="Open Sans" panose="020B0606030504020204" pitchFamily="34" charset="0"/>
+                <a:cs typeface="Open Sans" panose="020B0606030504020204" pitchFamily="34" charset="0"/>
+              </a:rPr>
+              <a:t>Cepstral (26 feature T=2s) - Cubic SVM</a:t>
+            </a:r>
+          </a:p>
+          <a:p>
+            <a:pPr marL="800100" lvl="1" indent="-342900" fontAlgn="base">
+              <a:buFont typeface="Arial" panose="020B0604020202020204" pitchFamily="34" charset="0"/>
+              <a:buChar char="•"/>
+            </a:pPr>
+            <a:r>
+              <a:rPr lang="en-US" sz="2400" dirty="0">
+                <a:solidFill>
+                  <a:schemeClr val="bg1"/>
+                </a:solidFill>
+                <a:latin typeface="Open Sans" panose="020B0606030504020204" pitchFamily="34" charset="0"/>
+                <a:ea typeface="Open Sans" panose="020B0606030504020204" pitchFamily="34" charset="0"/>
+                <a:cs typeface="Open Sans" panose="020B0606030504020204" pitchFamily="34" charset="0"/>
+              </a:rPr>
+              <a:t>Best non-NN, non-wavelet performer with accuracy of 92.8%</a:t>
             </a:r>
           </a:p>
         </p:txBody>
       </p:sp>
+      <p:pic>
+        <p:nvPicPr>
+          <p:cNvPr id="23" name="Picture 22">
+            <a:extLst>
+              <a:ext uri="{FF2B5EF4-FFF2-40B4-BE49-F238E27FC236}">
+                <a16:creationId xmlns:a16="http://schemas.microsoft.com/office/drawing/2014/main" id="{D7ADD7D7-7D5A-4BEA-B2D8-41F60D0D5244}"/>
+              </a:ext>
+            </a:extLst>
+          </p:cNvPr>
+          <p:cNvPicPr>
+            <a:picLocks noChangeAspect="1"/>
+          </p:cNvPicPr>
+          <p:nvPr/>
+        </p:nvPicPr>
+        <p:blipFill>
+          <a:blip r:embed="rId4"/>
+          <a:stretch>
+            <a:fillRect/>
+          </a:stretch>
+        </p:blipFill>
+        <p:spPr>
+          <a:xfrm>
+            <a:off x="11226018" y="13302216"/>
+            <a:ext cx="3899682" cy="2944626"/>
+          </a:xfrm>
+          <a:prstGeom prst="rect">
+            <a:avLst/>
+          </a:prstGeom>
+        </p:spPr>
+      </p:pic>
+      <p:sp>
+        <p:nvSpPr>
+          <p:cNvPr id="29" name="Rectangle 28">
+            <a:extLst>
+              <a:ext uri="{FF2B5EF4-FFF2-40B4-BE49-F238E27FC236}">
+                <a16:creationId xmlns:a16="http://schemas.microsoft.com/office/drawing/2014/main" id="{B1079DF4-29B7-47A2-A6A1-6D09194CBD63}"/>
+              </a:ext>
+            </a:extLst>
+          </p:cNvPr>
+          <p:cNvSpPr/>
+          <p:nvPr/>
+        </p:nvSpPr>
+        <p:spPr>
+          <a:xfrm>
+            <a:off x="11163300" y="16908649"/>
+            <a:ext cx="4019550" cy="3060700"/>
+          </a:xfrm>
+          <a:prstGeom prst="rect">
+            <a:avLst/>
+          </a:prstGeom>
+        </p:spPr>
+        <p:style>
+          <a:lnRef idx="2">
+            <a:schemeClr val="accent1">
+              <a:shade val="50000"/>
+            </a:schemeClr>
+          </a:lnRef>
+          <a:fillRef idx="1">
+            <a:schemeClr val="accent1"/>
+          </a:fillRef>
+          <a:effectRef idx="0">
+            <a:schemeClr val="accent1"/>
+          </a:effectRef>
+          <a:fontRef idx="minor">
+            <a:schemeClr val="lt1"/>
+          </a:fontRef>
+        </p:style>
+        <p:txBody>
+          <a:bodyPr rtlCol="0" anchor="ctr"/>
+          <a:lstStyle/>
+          <a:p>
+            <a:pPr algn="ctr"/>
+            <a:endParaRPr lang="en-US"/>
+          </a:p>
+        </p:txBody>
+      </p:sp>
+      <p:pic>
+        <p:nvPicPr>
+          <p:cNvPr id="24" name="Picture 23">
+            <a:extLst>
+              <a:ext uri="{FF2B5EF4-FFF2-40B4-BE49-F238E27FC236}">
+                <a16:creationId xmlns:a16="http://schemas.microsoft.com/office/drawing/2014/main" id="{9081AA8E-A1DE-448E-AA5B-88D0E96AF688}"/>
+              </a:ext>
+            </a:extLst>
+          </p:cNvPr>
+          <p:cNvPicPr>
+            <a:picLocks noChangeAspect="1"/>
+          </p:cNvPicPr>
+          <p:nvPr/>
+        </p:nvPicPr>
+        <p:blipFill>
+          <a:blip r:embed="rId5"/>
+          <a:stretch>
+            <a:fillRect/>
+          </a:stretch>
+        </p:blipFill>
+        <p:spPr>
+          <a:xfrm>
+            <a:off x="11226018" y="16965208"/>
+            <a:ext cx="3900205" cy="2953002"/>
+          </a:xfrm>
+          <a:prstGeom prst="rect">
+            <a:avLst/>
+          </a:prstGeom>
+        </p:spPr>
+      </p:pic>
     </p:spTree>
     <p:extLst>
       <p:ext uri="{BB962C8B-B14F-4D97-AF65-F5344CB8AC3E}">

</xml_diff>

<commit_message>
updated poster with SNR sweeps
</commit_message>
<xml_diff>
--- a/devdocs/EnvNoiseDetectorPosterExample.pptx
+++ b/devdocs/EnvNoiseDetectorPosterExample.pptx
@@ -123,6 +123,14 @@
 </p:presentation>
 </file>
 
+<file path=ppt/revisionInfo.xml><?xml version="1.0" encoding="utf-8"?>
+<p1510:revInfo xmlns:a="http://schemas.openxmlformats.org/drawingml/2006/main" xmlns:r="http://schemas.openxmlformats.org/officeDocument/2006/relationships" xmlns:p1510="http://schemas.microsoft.com/office/powerpoint/2015/10/main">
+  <p1510:revLst>
+    <p1510:client id="{BAB375EC-1736-4FBE-AAD6-8B43B5C28312}" v="7" dt="2019-03-02T23:28:56.571"/>
+  </p1510:revLst>
+</p1510:revInfo>
+</file>
+
 <file path=ppt/changesInfos/changesInfo1.xml><?xml version="1.0" encoding="utf-8"?>
 <pc:chgInfo xmlns:a="http://schemas.openxmlformats.org/drawingml/2006/main" xmlns:r="http://schemas.openxmlformats.org/officeDocument/2006/relationships" xmlns:ac="http://schemas.microsoft.com/office/drawing/2013/main/command" xmlns:pc="http://schemas.microsoft.com/office/powerpoint/2013/main/command">
   <pc:docChgLst>
@@ -146,6 +154,86 @@
             <ac:spMk id="27" creationId="{4D175D9D-1009-468A-A739-F755DB191293}"/>
           </ac:spMkLst>
         </pc:spChg>
+      </pc:sldChg>
+    </pc:docChg>
+  </pc:docChgLst>
+  <pc:docChgLst>
+    <pc:chgData name="Todd Schultz" userId="ba2af144d448b369" providerId="LiveId" clId="{BAB375EC-1736-4FBE-AAD6-8B43B5C28312}"/>
+    <pc:docChg chg="custSel modSld">
+      <pc:chgData name="Todd Schultz" userId="ba2af144d448b369" providerId="LiveId" clId="{BAB375EC-1736-4FBE-AAD6-8B43B5C28312}" dt="2019-03-02T23:29:01.941" v="118" actId="1076"/>
+      <pc:docMkLst>
+        <pc:docMk/>
+      </pc:docMkLst>
+      <pc:sldChg chg="addSp delSp modSp setBg">
+        <pc:chgData name="Todd Schultz" userId="ba2af144d448b369" providerId="LiveId" clId="{BAB375EC-1736-4FBE-AAD6-8B43B5C28312}" dt="2019-03-02T23:29:01.941" v="118" actId="1076"/>
+        <pc:sldMkLst>
+          <pc:docMk/>
+          <pc:sldMk cId="2702275411" sldId="256"/>
+        </pc:sldMkLst>
+        <pc:spChg chg="mod">
+          <ac:chgData name="Todd Schultz" userId="ba2af144d448b369" providerId="LiveId" clId="{BAB375EC-1736-4FBE-AAD6-8B43B5C28312}" dt="2019-03-02T23:24:16.886" v="102" actId="1036"/>
+          <ac:spMkLst>
+            <pc:docMk/>
+            <pc:sldMk cId="2702275411" sldId="256"/>
+            <ac:spMk id="21" creationId="{D7062249-7C6F-4D47-812D-682F4C5670B8}"/>
+          </ac:spMkLst>
+        </pc:spChg>
+        <pc:spChg chg="mod">
+          <ac:chgData name="Todd Schultz" userId="ba2af144d448b369" providerId="LiveId" clId="{BAB375EC-1736-4FBE-AAD6-8B43B5C28312}" dt="2019-03-02T23:24:08.264" v="69" actId="14100"/>
+          <ac:spMkLst>
+            <pc:docMk/>
+            <pc:sldMk cId="2702275411" sldId="256"/>
+            <ac:spMk id="27" creationId="{4D175D9D-1009-468A-A739-F755DB191293}"/>
+          </ac:spMkLst>
+        </pc:spChg>
+        <pc:graphicFrameChg chg="mod modGraphic">
+          <ac:chgData name="Todd Schultz" userId="ba2af144d448b369" providerId="LiveId" clId="{BAB375EC-1736-4FBE-AAD6-8B43B5C28312}" dt="2019-03-02T23:24:01.586" v="67" actId="14100"/>
+          <ac:graphicFrameMkLst>
+            <pc:docMk/>
+            <pc:sldMk cId="2702275411" sldId="256"/>
+            <ac:graphicFrameMk id="2" creationId="{633E8D09-0C7F-4452-8588-6892C031B1AF}"/>
+          </ac:graphicFrameMkLst>
+        </pc:graphicFrameChg>
+        <pc:picChg chg="add del mod">
+          <ac:chgData name="Todd Schultz" userId="ba2af144d448b369" providerId="LiveId" clId="{BAB375EC-1736-4FBE-AAD6-8B43B5C28312}" dt="2019-03-02T23:25:48.967" v="106" actId="478"/>
+          <ac:picMkLst>
+            <pc:docMk/>
+            <pc:sldMk cId="2702275411" sldId="256"/>
+            <ac:picMk id="30" creationId="{1D02818F-E94A-4138-9460-54A599869377}"/>
+          </ac:picMkLst>
+        </pc:picChg>
+        <pc:picChg chg="add del mod">
+          <ac:chgData name="Todd Schultz" userId="ba2af144d448b369" providerId="LiveId" clId="{BAB375EC-1736-4FBE-AAD6-8B43B5C28312}" dt="2019-03-02T23:26:25.459" v="110" actId="478"/>
+          <ac:picMkLst>
+            <pc:docMk/>
+            <pc:sldMk cId="2702275411" sldId="256"/>
+            <ac:picMk id="31" creationId="{4BBB04EA-88AB-44B3-ACDA-10C408553E6D}"/>
+          </ac:picMkLst>
+        </pc:picChg>
+        <pc:picChg chg="add mod">
+          <ac:chgData name="Todd Schultz" userId="ba2af144d448b369" providerId="LiveId" clId="{BAB375EC-1736-4FBE-AAD6-8B43B5C28312}" dt="2019-03-02T23:29:01.941" v="118" actId="1076"/>
+          <ac:picMkLst>
+            <pc:docMk/>
+            <pc:sldMk cId="2702275411" sldId="256"/>
+            <ac:picMk id="32" creationId="{446E9D9D-CC6D-4A92-8219-C9E922EAC978}"/>
+          </ac:picMkLst>
+        </pc:picChg>
+        <pc:picChg chg="add mod">
+          <ac:chgData name="Todd Schultz" userId="ba2af144d448b369" providerId="LiveId" clId="{BAB375EC-1736-4FBE-AAD6-8B43B5C28312}" dt="2019-03-02T23:29:00.242" v="117" actId="1076"/>
+          <ac:picMkLst>
+            <pc:docMk/>
+            <pc:sldMk cId="2702275411" sldId="256"/>
+            <ac:picMk id="33" creationId="{F49EDAA7-C821-4F6A-A618-F1031A0094EE}"/>
+          </ac:picMkLst>
+        </pc:picChg>
+        <pc:picChg chg="add mod">
+          <ac:chgData name="Todd Schultz" userId="ba2af144d448b369" providerId="LiveId" clId="{BAB375EC-1736-4FBE-AAD6-8B43B5C28312}" dt="2019-03-02T23:28:58.656" v="116" actId="1076"/>
+          <ac:picMkLst>
+            <pc:docMk/>
+            <pc:sldMk cId="2702275411" sldId="256"/>
+            <ac:picMk id="34" creationId="{A9CA9739-9FB2-4DF3-83BD-C025B15454CC}"/>
+          </ac:picMkLst>
+        </pc:picChg>
       </pc:sldChg>
     </pc:docChg>
   </pc:docChgLst>
@@ -4286,7 +4374,7 @@
         </p:nvSpPr>
         <p:spPr>
           <a:xfrm>
-            <a:off x="16170004" y="12357598"/>
+            <a:off x="16170004" y="18256954"/>
             <a:ext cx="17889767" cy="584775"/>
           </a:xfrm>
           <a:prstGeom prst="rect">
@@ -4585,14 +4673,14 @@
           <p:nvPr>
             <p:extLst>
               <p:ext uri="{D42A27DB-BD31-4B8C-83A1-F6EECF244321}">
-                <p14:modId xmlns:p14="http://schemas.microsoft.com/office/powerpoint/2010/main" val="3609564310"/>
+                <p14:modId xmlns:p14="http://schemas.microsoft.com/office/powerpoint/2010/main" val="3341373541"/>
               </p:ext>
             </p:extLst>
           </p:nvPr>
         </p:nvGraphicFramePr>
         <p:xfrm>
-          <a:off x="16201258" y="4829083"/>
-          <a:ext cx="12280672" cy="6775361"/>
+          <a:off x="16201257" y="4829083"/>
+          <a:ext cx="17858515" cy="9535842"/>
         </p:xfrm>
         <a:graphic>
           <a:graphicData uri="http://schemas.openxmlformats.org/drawingml/2006/table">
@@ -4601,126 +4689,126 @@
                 <a:tableStyleId>{5C22544A-7EE6-4342-B048-85BDC9FD1C3A}</a:tableStyleId>
               </a:tblPr>
               <a:tblGrid>
-                <a:gridCol w="2299564">
+                <a:gridCol w="3344018">
                   <a:extLst>
                     <a:ext uri="{9D8B030D-6E8A-4147-A177-3AD203B41FA5}">
                       <a16:colId xmlns:a16="http://schemas.microsoft.com/office/drawing/2014/main" val="1151871436"/>
                     </a:ext>
                   </a:extLst>
                 </a:gridCol>
-                <a:gridCol w="587124">
+                <a:gridCol w="853794">
                   <a:extLst>
                     <a:ext uri="{9D8B030D-6E8A-4147-A177-3AD203B41FA5}">
                       <a16:colId xmlns:a16="http://schemas.microsoft.com/office/drawing/2014/main" val="2393237374"/>
                     </a:ext>
                   </a:extLst>
                 </a:gridCol>
-                <a:gridCol w="598600">
+                <a:gridCol w="870482">
                   <a:extLst>
                     <a:ext uri="{9D8B030D-6E8A-4147-A177-3AD203B41FA5}">
                       <a16:colId xmlns:a16="http://schemas.microsoft.com/office/drawing/2014/main" val="335090396"/>
                     </a:ext>
                   </a:extLst>
                 </a:gridCol>
-                <a:gridCol w="575648">
+                <a:gridCol w="837105">
                   <a:extLst>
                     <a:ext uri="{9D8B030D-6E8A-4147-A177-3AD203B41FA5}">
                       <a16:colId xmlns:a16="http://schemas.microsoft.com/office/drawing/2014/main" val="3717863262"/>
                     </a:ext>
                   </a:extLst>
                 </a:gridCol>
-                <a:gridCol w="587124">
+                <a:gridCol w="853794">
                   <a:extLst>
                     <a:ext uri="{9D8B030D-6E8A-4147-A177-3AD203B41FA5}">
                       <a16:colId xmlns:a16="http://schemas.microsoft.com/office/drawing/2014/main" val="2897946089"/>
                     </a:ext>
                   </a:extLst>
                 </a:gridCol>
-                <a:gridCol w="587124">
+                <a:gridCol w="853794">
                   <a:extLst>
                     <a:ext uri="{9D8B030D-6E8A-4147-A177-3AD203B41FA5}">
                       <a16:colId xmlns:a16="http://schemas.microsoft.com/office/drawing/2014/main" val="2621680780"/>
                     </a:ext>
                   </a:extLst>
                 </a:gridCol>
-                <a:gridCol w="587124">
+                <a:gridCol w="853794">
                   <a:extLst>
                     <a:ext uri="{9D8B030D-6E8A-4147-A177-3AD203B41FA5}">
                       <a16:colId xmlns:a16="http://schemas.microsoft.com/office/drawing/2014/main" val="530238323"/>
                     </a:ext>
                   </a:extLst>
                 </a:gridCol>
-                <a:gridCol w="587124">
+                <a:gridCol w="853794">
                   <a:extLst>
                     <a:ext uri="{9D8B030D-6E8A-4147-A177-3AD203B41FA5}">
                       <a16:colId xmlns:a16="http://schemas.microsoft.com/office/drawing/2014/main" val="3264923264"/>
                     </a:ext>
                   </a:extLst>
                 </a:gridCol>
-                <a:gridCol w="587124">
+                <a:gridCol w="853794">
                   <a:extLst>
                     <a:ext uri="{9D8B030D-6E8A-4147-A177-3AD203B41FA5}">
                       <a16:colId xmlns:a16="http://schemas.microsoft.com/office/drawing/2014/main" val="3377233041"/>
                     </a:ext>
                   </a:extLst>
                 </a:gridCol>
-                <a:gridCol w="587124">
+                <a:gridCol w="853794">
                   <a:extLst>
                     <a:ext uri="{9D8B030D-6E8A-4147-A177-3AD203B41FA5}">
                       <a16:colId xmlns:a16="http://schemas.microsoft.com/office/drawing/2014/main" val="514851023"/>
                     </a:ext>
                   </a:extLst>
                 </a:gridCol>
-                <a:gridCol w="587124">
+                <a:gridCol w="853794">
                   <a:extLst>
                     <a:ext uri="{9D8B030D-6E8A-4147-A177-3AD203B41FA5}">
                       <a16:colId xmlns:a16="http://schemas.microsoft.com/office/drawing/2014/main" val="829764803"/>
                     </a:ext>
                   </a:extLst>
                 </a:gridCol>
-                <a:gridCol w="587124">
+                <a:gridCol w="853794">
                   <a:extLst>
                     <a:ext uri="{9D8B030D-6E8A-4147-A177-3AD203B41FA5}">
                       <a16:colId xmlns:a16="http://schemas.microsoft.com/office/drawing/2014/main" val="1008829834"/>
                     </a:ext>
                   </a:extLst>
                 </a:gridCol>
-                <a:gridCol w="587124">
+                <a:gridCol w="853794">
                   <a:extLst>
                     <a:ext uri="{9D8B030D-6E8A-4147-A177-3AD203B41FA5}">
                       <a16:colId xmlns:a16="http://schemas.microsoft.com/office/drawing/2014/main" val="950132651"/>
                     </a:ext>
                   </a:extLst>
                 </a:gridCol>
-                <a:gridCol w="587124">
+                <a:gridCol w="853794">
                   <a:extLst>
                     <a:ext uri="{9D8B030D-6E8A-4147-A177-3AD203B41FA5}">
                       <a16:colId xmlns:a16="http://schemas.microsoft.com/office/drawing/2014/main" val="45596056"/>
                     </a:ext>
                   </a:extLst>
                 </a:gridCol>
-                <a:gridCol w="587124">
+                <a:gridCol w="853794">
                   <a:extLst>
                     <a:ext uri="{9D8B030D-6E8A-4147-A177-3AD203B41FA5}">
                       <a16:colId xmlns:a16="http://schemas.microsoft.com/office/drawing/2014/main" val="2795060661"/>
                     </a:ext>
                   </a:extLst>
                 </a:gridCol>
-                <a:gridCol w="587124">
+                <a:gridCol w="853794">
                   <a:extLst>
                     <a:ext uri="{9D8B030D-6E8A-4147-A177-3AD203B41FA5}">
                       <a16:colId xmlns:a16="http://schemas.microsoft.com/office/drawing/2014/main" val="558077079"/>
                     </a:ext>
                   </a:extLst>
                 </a:gridCol>
-                <a:gridCol w="587124">
+                <a:gridCol w="853794">
                   <a:extLst>
                     <a:ext uri="{9D8B030D-6E8A-4147-A177-3AD203B41FA5}">
                       <a16:colId xmlns:a16="http://schemas.microsoft.com/office/drawing/2014/main" val="261827523"/>
                     </a:ext>
                   </a:extLst>
                 </a:gridCol>
-                <a:gridCol w="587124">
+                <a:gridCol w="853794">
                   <a:extLst>
                     <a:ext uri="{9D8B030D-6E8A-4147-A177-3AD203B41FA5}">
                       <a16:colId xmlns:a16="http://schemas.microsoft.com/office/drawing/2014/main" val="805535808"/>
@@ -4728,7 +4816,7 @@
                   </a:extLst>
                 </a:gridCol>
               </a:tblGrid>
-              <a:tr h="743626">
+              <a:tr h="1046602">
                 <a:tc>
                   <a:txBody>
                     <a:bodyPr/>
@@ -5331,7 +5419,7 @@
                   </a:ext>
                 </a:extLst>
               </a:tr>
-              <a:tr h="215959">
+              <a:tr h="303947">
                 <a:tc>
                   <a:txBody>
                     <a:bodyPr/>
@@ -5946,7 +6034,7 @@
                   </a:ext>
                 </a:extLst>
               </a:tr>
-              <a:tr h="215959">
+              <a:tr h="303947">
                 <a:tc>
                   <a:txBody>
                     <a:bodyPr/>
@@ -6397,7 +6485,7 @@
                   </a:ext>
                 </a:extLst>
               </a:tr>
-              <a:tr h="215959">
+              <a:tr h="303947">
                 <a:tc>
                   <a:txBody>
                     <a:bodyPr/>
@@ -6835,7 +6923,7 @@
                   </a:ext>
                 </a:extLst>
               </a:tr>
-              <a:tr h="215959">
+              <a:tr h="303947">
                 <a:tc>
                   <a:txBody>
                     <a:bodyPr/>
@@ -7313,7 +7401,7 @@
                   </a:ext>
                 </a:extLst>
               </a:tr>
-              <a:tr h="215959">
+              <a:tr h="303947">
                 <a:tc>
                   <a:txBody>
                     <a:bodyPr/>
@@ -7751,7 +7839,7 @@
                   </a:ext>
                 </a:extLst>
               </a:tr>
-              <a:tr h="215959">
+              <a:tr h="303947">
                 <a:tc>
                   <a:txBody>
                     <a:bodyPr/>
@@ -8202,7 +8290,7 @@
                   </a:ext>
                 </a:extLst>
               </a:tr>
-              <a:tr h="215959">
+              <a:tr h="303947">
                 <a:tc>
                   <a:txBody>
                     <a:bodyPr/>
@@ -8640,7 +8728,7 @@
                   </a:ext>
                 </a:extLst>
               </a:tr>
-              <a:tr h="215959">
+              <a:tr h="303947">
                 <a:tc>
                   <a:txBody>
                     <a:bodyPr/>
@@ -9084,7 +9172,7 @@
                   </a:ext>
                 </a:extLst>
               </a:tr>
-              <a:tr h="215959">
+              <a:tr h="303947">
                 <a:tc>
                   <a:txBody>
                     <a:bodyPr/>
@@ -9522,7 +9610,7 @@
                   </a:ext>
                 </a:extLst>
               </a:tr>
-              <a:tr h="215959">
+              <a:tr h="303947">
                 <a:tc>
                   <a:txBody>
                     <a:bodyPr/>
@@ -9966,7 +10054,7 @@
                   </a:ext>
                 </a:extLst>
               </a:tr>
-              <a:tr h="215959">
+              <a:tr h="303947">
                 <a:tc>
                   <a:txBody>
                     <a:bodyPr/>
@@ -10356,7 +10444,7 @@
                   </a:ext>
                 </a:extLst>
               </a:tr>
-              <a:tr h="215959">
+              <a:tr h="303947">
                 <a:tc>
                   <a:txBody>
                     <a:bodyPr/>
@@ -10746,7 +10834,7 @@
                   </a:ext>
                 </a:extLst>
               </a:tr>
-              <a:tr h="215959">
+              <a:tr h="303947">
                 <a:tc>
                   <a:txBody>
                     <a:bodyPr/>
@@ -11125,7 +11213,7 @@
                   </a:ext>
                 </a:extLst>
               </a:tr>
-              <a:tr h="215959">
+              <a:tr h="303947">
                 <a:tc>
                   <a:txBody>
                     <a:bodyPr/>
@@ -11497,7 +11585,7 @@
                   </a:ext>
                 </a:extLst>
               </a:tr>
-              <a:tr h="200842">
+              <a:tr h="282671">
                 <a:tc>
                   <a:txBody>
                     <a:bodyPr/>
@@ -11869,7 +11957,7 @@
                   </a:ext>
                 </a:extLst>
               </a:tr>
-              <a:tr h="215959">
+              <a:tr h="303947">
                 <a:tc>
                   <a:txBody>
                     <a:bodyPr/>
@@ -12307,7 +12395,7 @@
                   </a:ext>
                 </a:extLst>
               </a:tr>
-              <a:tr h="215959">
+              <a:tr h="303947">
                 <a:tc>
                   <a:txBody>
                     <a:bodyPr/>
@@ -12745,7 +12833,7 @@
                   </a:ext>
                 </a:extLst>
               </a:tr>
-              <a:tr h="215959">
+              <a:tr h="303947">
                 <a:tc>
                   <a:txBody>
                     <a:bodyPr/>
@@ -13190,7 +13278,7 @@
                   </a:ext>
                 </a:extLst>
               </a:tr>
-              <a:tr h="215959">
+              <a:tr h="303947">
                 <a:tc>
                   <a:txBody>
                     <a:bodyPr/>
@@ -13660,7 +13748,7 @@
                   </a:ext>
                 </a:extLst>
               </a:tr>
-              <a:tr h="215959">
+              <a:tr h="303947">
                 <a:tc>
                   <a:txBody>
                     <a:bodyPr/>
@@ -14075,12 +14163,12 @@
                     <a:p>
                       <a:pPr algn="ctr" fontAlgn="b"/>
                       <a:r>
-                        <a:rPr lang="en-US" sz="1100" u="none" strike="noStrike">
+                        <a:rPr lang="en-US" sz="1100" u="none" strike="noStrike" dirty="0">
                           <a:effectLst/>
                         </a:rPr>
                         <a:t>81.5%</a:t>
                       </a:r>
-                      <a:endParaRPr lang="en-US" sz="1100" b="0" i="0" u="none" strike="noStrike">
+                      <a:endParaRPr lang="en-US" sz="1100" b="0" i="0" u="none" strike="noStrike" dirty="0">
                         <a:solidFill>
                           <a:srgbClr val="000000"/>
                         </a:solidFill>
@@ -14137,7 +14225,7 @@
                   </a:ext>
                 </a:extLst>
               </a:tr>
-              <a:tr h="215959">
+              <a:tr h="303947">
                 <a:tc>
                   <a:txBody>
                     <a:bodyPr/>
@@ -14608,7 +14696,7 @@
                   </a:ext>
                 </a:extLst>
               </a:tr>
-              <a:tr h="215959">
+              <a:tr h="303947">
                 <a:tc>
                   <a:txBody>
                     <a:bodyPr/>
@@ -15085,7 +15173,7 @@
                   </a:ext>
                 </a:extLst>
               </a:tr>
-              <a:tr h="215959">
+              <a:tr h="303947">
                 <a:tc>
                   <a:txBody>
                     <a:bodyPr/>
@@ -15556,7 +15644,7 @@
                   </a:ext>
                 </a:extLst>
               </a:tr>
-              <a:tr h="215959">
+              <a:tr h="303947">
                 <a:tc>
                   <a:txBody>
                     <a:bodyPr/>
@@ -16013,7 +16101,7 @@
                   </a:ext>
                 </a:extLst>
               </a:tr>
-              <a:tr h="215959">
+              <a:tr h="303947">
                 <a:tc>
                   <a:txBody>
                     <a:bodyPr/>
@@ -16464,7 +16552,7 @@
                   </a:ext>
                 </a:extLst>
               </a:tr>
-              <a:tr h="215959">
+              <a:tr h="303947">
                 <a:tc>
                   <a:txBody>
                     <a:bodyPr/>
@@ -16920,7 +17008,7 @@
                   </a:ext>
                 </a:extLst>
               </a:tr>
-              <a:tr h="215959">
+              <a:tr h="303947">
                 <a:tc>
                   <a:txBody>
                     <a:bodyPr/>
@@ -17378,7 +17466,7 @@
                   </a:ext>
                 </a:extLst>
               </a:tr>
-              <a:tr h="215959">
+              <a:tr h="303947">
                 <a:tc>
                   <a:txBody>
                     <a:bodyPr/>
@@ -17847,8 +17935,8 @@
         </p:nvSpPr>
         <p:spPr>
           <a:xfrm>
-            <a:off x="28645942" y="4611832"/>
-            <a:ext cx="5413829" cy="6247864"/>
+            <a:off x="16112854" y="14710629"/>
+            <a:ext cx="15035740" cy="3170099"/>
           </a:xfrm>
           <a:prstGeom prst="rect">
             <a:avLst/>
@@ -18087,6 +18175,96 @@
           <a:xfrm>
             <a:off x="11226018" y="16965208"/>
             <a:ext cx="3900205" cy="2953002"/>
+          </a:xfrm>
+          <a:prstGeom prst="rect">
+            <a:avLst/>
+          </a:prstGeom>
+        </p:spPr>
+      </p:pic>
+      <p:pic>
+        <p:nvPicPr>
+          <p:cNvPr id="32" name="Picture 31">
+            <a:extLst>
+              <a:ext uri="{FF2B5EF4-FFF2-40B4-BE49-F238E27FC236}">
+                <a16:creationId xmlns:a16="http://schemas.microsoft.com/office/drawing/2014/main" id="{446E9D9D-CC6D-4A92-8219-C9E922EAC978}"/>
+              </a:ext>
+            </a:extLst>
+          </p:cNvPr>
+          <p:cNvPicPr>
+            <a:picLocks noChangeAspect="1"/>
+          </p:cNvPicPr>
+          <p:nvPr/>
+        </p:nvPicPr>
+        <p:blipFill>
+          <a:blip r:embed="rId6"/>
+          <a:stretch>
+            <a:fillRect/>
+          </a:stretch>
+        </p:blipFill>
+        <p:spPr>
+          <a:xfrm>
+            <a:off x="28830689" y="19266857"/>
+            <a:ext cx="5187657" cy="6933801"/>
+          </a:xfrm>
+          <a:prstGeom prst="rect">
+            <a:avLst/>
+          </a:prstGeom>
+        </p:spPr>
+      </p:pic>
+      <p:pic>
+        <p:nvPicPr>
+          <p:cNvPr id="33" name="Picture 32">
+            <a:extLst>
+              <a:ext uri="{FF2B5EF4-FFF2-40B4-BE49-F238E27FC236}">
+                <a16:creationId xmlns:a16="http://schemas.microsoft.com/office/drawing/2014/main" id="{F49EDAA7-C821-4F6A-A618-F1031A0094EE}"/>
+              </a:ext>
+            </a:extLst>
+          </p:cNvPr>
+          <p:cNvPicPr>
+            <a:picLocks noChangeAspect="1"/>
+          </p:cNvPicPr>
+          <p:nvPr/>
+        </p:nvPicPr>
+        <p:blipFill>
+          <a:blip r:embed="rId7"/>
+          <a:stretch>
+            <a:fillRect/>
+          </a:stretch>
+        </p:blipFill>
+        <p:spPr>
+          <a:xfrm>
+            <a:off x="22473864" y="19217667"/>
+            <a:ext cx="5187657" cy="6933801"/>
+          </a:xfrm>
+          <a:prstGeom prst="rect">
+            <a:avLst/>
+          </a:prstGeom>
+        </p:spPr>
+      </p:pic>
+      <p:pic>
+        <p:nvPicPr>
+          <p:cNvPr id="34" name="Picture 33">
+            <a:extLst>
+              <a:ext uri="{FF2B5EF4-FFF2-40B4-BE49-F238E27FC236}">
+                <a16:creationId xmlns:a16="http://schemas.microsoft.com/office/drawing/2014/main" id="{A9CA9739-9FB2-4DF3-83BD-C025B15454CC}"/>
+              </a:ext>
+            </a:extLst>
+          </p:cNvPr>
+          <p:cNvPicPr>
+            <a:picLocks noChangeAspect="1"/>
+          </p:cNvPicPr>
+          <p:nvPr/>
+        </p:nvPicPr>
+        <p:blipFill>
+          <a:blip r:embed="rId8"/>
+          <a:stretch>
+            <a:fillRect/>
+          </a:stretch>
+        </p:blipFill>
+        <p:spPr>
+          <a:xfrm>
+            <a:off x="16352018" y="19266857"/>
+            <a:ext cx="5187657" cy="6933801"/>
           </a:xfrm>
           <a:prstGeom prst="rect">
             <a:avLst/>

</xml_diff>